<commit_message>
add react reconcile render
</commit_message>
<xml_diff>
--- a/公众号封面.pptx
+++ b/公众号封面.pptx
@@ -5,10 +5,11 @@
     <p:sldMasterId id="2147483648" r:id="rId1"/>
   </p:sldMasterIdLst>
   <p:notesMasterIdLst>
-    <p:notesMasterId r:id="rId4"/>
+    <p:notesMasterId r:id="rId5"/>
   </p:notesMasterIdLst>
   <p:sldIdLst>
     <p:sldId id="281" r:id="rId3"/>
+    <p:sldId id="282" r:id="rId4"/>
   </p:sldIdLst>
   <p:sldSz cx="12192000" cy="6858000"/>
   <p:notesSz cx="6858000" cy="9144000"/>
@@ -3594,7 +3595,6 @@
               <a:pPr algn="ctr"/>
               <a:r>
                 <a:rPr lang="zh-CN" altLang="en-US" sz="4400">
-                  <a:ln/>
                   <a:solidFill>
                     <a:schemeClr val="bg2"/>
                   </a:solidFill>
@@ -3611,7 +3611,6 @@
                 <a:t>编译原理</a:t>
               </a:r>
               <a:endParaRPr lang="zh-CN" altLang="en-US" sz="4400">
-                <a:ln/>
                 <a:solidFill>
                   <a:schemeClr val="bg2"/>
                 </a:solidFill>
@@ -3669,6 +3668,226 @@
                   <a:ea typeface="HanziPen SC Regular" panose="03000300000000000000" charset="-122"/>
                 </a:rPr>
                 <a:t>手写一门解析型语言</a:t>
+              </a:r>
+              <a:endParaRPr lang="zh-CN" altLang="en-US" sz="2400">
+                <a:solidFill>
+                  <a:schemeClr val="bg1"/>
+                </a:solidFill>
+                <a:effectLst>
+                  <a:outerShdw blurRad="38100" dist="19050" dir="2700000" algn="tl" rotWithShape="0">
+                    <a:schemeClr val="dk1">
+                      <a:alpha val="40000"/>
+                    </a:schemeClr>
+                  </a:outerShdw>
+                </a:effectLst>
+                <a:latin typeface="HanziPen SC Regular" panose="03000300000000000000" charset="-122"/>
+                <a:ea typeface="HanziPen SC Regular" panose="03000300000000000000" charset="-122"/>
+              </a:endParaRPr>
+            </a:p>
+          </p:txBody>
+        </p:sp>
+      </p:grpSp>
+    </p:spTree>
+  </p:cSld>
+  <p:clrMapOvr>
+    <a:masterClrMapping/>
+  </p:clrMapOvr>
+  <mc:AlternateContent xmlns:mc="http://schemas.openxmlformats.org/markup-compatibility/2006">
+    <mc:Choice xmlns:p14="http://schemas.microsoft.com/office/powerpoint/2010/main" Requires="p14">
+      <p:transition spd="slow" p14:dur="1500" advClick="0" advTm="0">
+        <p:random/>
+      </p:transition>
+    </mc:Choice>
+    <mc:Fallback>
+      <p:transition spd="slow" advClick="0" advTm="0">
+        <p:random/>
+      </p:transition>
+    </mc:Fallback>
+  </mc:AlternateContent>
+</p:sld>
+</file>
+
+<file path=ppt/slides/slide2.xml><?xml version="1.0" encoding="utf-8"?>
+<p:sld xmlns:a="http://schemas.openxmlformats.org/drawingml/2006/main" xmlns:r="http://schemas.openxmlformats.org/officeDocument/2006/relationships" xmlns:p="http://schemas.openxmlformats.org/presentationml/2006/main">
+  <p:cSld>
+    <p:spTree>
+      <p:nvGrpSpPr>
+        <p:cNvPr id="1" name=""/>
+        <p:cNvGrpSpPr/>
+        <p:nvPr/>
+      </p:nvGrpSpPr>
+      <p:grpSpPr/>
+      <p:grpSp>
+        <p:nvGrpSpPr>
+          <p:cNvPr id="7" name="组合 6"/>
+          <p:cNvGrpSpPr/>
+          <p:nvPr/>
+        </p:nvGrpSpPr>
+        <p:grpSpPr>
+          <a:xfrm>
+            <a:off x="2769870" y="1480820"/>
+            <a:ext cx="5781040" cy="2459990"/>
+            <a:chOff x="4362" y="2332"/>
+            <a:chExt cx="9104" cy="3874"/>
+          </a:xfrm>
+        </p:grpSpPr>
+        <p:sp>
+          <p:nvSpPr>
+            <p:cNvPr id="3" name="矩形 2"/>
+            <p:cNvSpPr/>
+            <p:nvPr/>
+          </p:nvSpPr>
+          <p:spPr>
+            <a:xfrm>
+              <a:off x="4362" y="2332"/>
+              <a:ext cx="9104" cy="3874"/>
+            </a:xfrm>
+            <a:prstGeom prst="rect">
+              <a:avLst/>
+            </a:prstGeom>
+            <a:gradFill>
+              <a:gsLst>
+                <a:gs pos="0">
+                  <a:srgbClr val="007BD3"/>
+                </a:gs>
+                <a:gs pos="100000">
+                  <a:srgbClr val="034373"/>
+                </a:gs>
+              </a:gsLst>
+              <a:lin ang="5400000" scaled="0"/>
+            </a:gradFill>
+            <a:ln>
+              <a:noFill/>
+            </a:ln>
+          </p:spPr>
+          <p:style>
+            <a:lnRef idx="2">
+              <a:schemeClr val="accent1">
+                <a:shade val="50000"/>
+              </a:schemeClr>
+            </a:lnRef>
+            <a:fillRef idx="1">
+              <a:schemeClr val="accent1"/>
+            </a:fillRef>
+            <a:effectRef idx="0">
+              <a:schemeClr val="accent1"/>
+            </a:effectRef>
+            <a:fontRef idx="minor">
+              <a:schemeClr val="lt1"/>
+            </a:fontRef>
+          </p:style>
+          <p:txBody>
+            <a:bodyPr rtlCol="0" anchor="ctr"/>
+            <a:p>
+              <a:pPr algn="ctr"/>
+              <a:endParaRPr lang="zh-CN" altLang="en-US"/>
+            </a:p>
+          </p:txBody>
+        </p:sp>
+        <p:sp>
+          <p:nvSpPr>
+            <p:cNvPr id="5" name="矩形 4"/>
+            <p:cNvSpPr/>
+            <p:nvPr/>
+          </p:nvSpPr>
+          <p:spPr>
+            <a:xfrm>
+              <a:off x="7010" y="2876"/>
+              <a:ext cx="3808" cy="1210"/>
+            </a:xfrm>
+            <a:prstGeom prst="rect">
+              <a:avLst/>
+            </a:prstGeom>
+            <a:noFill/>
+            <a:ln>
+              <a:noFill/>
+            </a:ln>
+          </p:spPr>
+          <p:txBody>
+            <a:bodyPr wrap="none" rtlCol="0" anchor="t">
+              <a:spAutoFit/>
+              <a:scene3d>
+                <a:camera prst="orthographicFront"/>
+                <a:lightRig rig="threePt" dir="t"/>
+              </a:scene3d>
+            </a:bodyPr>
+            <a:p>
+              <a:pPr algn="ctr"/>
+              <a:r>
+                <a:rPr lang="zh-CN" altLang="en-US" sz="4400">
+                  <a:solidFill>
+                    <a:schemeClr val="bg2"/>
+                  </a:solidFill>
+                  <a:effectLst>
+                    <a:outerShdw blurRad="38100" dist="19050" dir="2700000" algn="tl" rotWithShape="0">
+                      <a:schemeClr val="dk1">
+                        <a:alpha val="40000"/>
+                      </a:schemeClr>
+                    </a:outerShdw>
+                  </a:effectLst>
+                  <a:latin typeface="雅痞-简" panose="020F0603040207020204" charset="-122"/>
+                  <a:ea typeface="雅痞-简" panose="020F0603040207020204" charset="-122"/>
+                </a:rPr>
+                <a:t>编译原理</a:t>
+              </a:r>
+              <a:endParaRPr lang="zh-CN" altLang="en-US" sz="4400">
+                <a:solidFill>
+                  <a:schemeClr val="bg2"/>
+                </a:solidFill>
+                <a:effectLst>
+                  <a:outerShdw blurRad="38100" dist="19050" dir="2700000" algn="tl" rotWithShape="0">
+                    <a:schemeClr val="dk1">
+                      <a:alpha val="40000"/>
+                    </a:schemeClr>
+                  </a:outerShdw>
+                </a:effectLst>
+                <a:latin typeface="雅痞-简" panose="020F0603040207020204" charset="-122"/>
+                <a:ea typeface="雅痞-简" panose="020F0603040207020204" charset="-122"/>
+              </a:endParaRPr>
+            </a:p>
+          </p:txBody>
+        </p:sp>
+        <p:sp>
+          <p:nvSpPr>
+            <p:cNvPr id="6" name="矩形 5"/>
+            <p:cNvSpPr/>
+            <p:nvPr/>
+          </p:nvSpPr>
+          <p:spPr>
+            <a:xfrm>
+              <a:off x="8130" y="4451"/>
+              <a:ext cx="1569" cy="725"/>
+            </a:xfrm>
+            <a:prstGeom prst="rect">
+              <a:avLst/>
+            </a:prstGeom>
+            <a:noFill/>
+            <a:ln>
+              <a:noFill/>
+            </a:ln>
+          </p:spPr>
+          <p:txBody>
+            <a:bodyPr wrap="none" rtlCol="0" anchor="t">
+              <a:spAutoFit/>
+            </a:bodyPr>
+            <a:p>
+              <a:pPr algn="ctr"/>
+              <a:r>
+                <a:rPr lang="en-US" altLang="zh-CN" sz="2400">
+                  <a:solidFill>
+                    <a:schemeClr val="bg1"/>
+                  </a:solidFill>
+                  <a:effectLst>
+                    <a:outerShdw blurRad="38100" dist="19050" dir="2700000" algn="tl" rotWithShape="0">
+                      <a:schemeClr val="dk1">
+                        <a:alpha val="40000"/>
+                      </a:schemeClr>
+                    </a:outerShdw>
+                  </a:effectLst>
+                  <a:latin typeface="HanziPen SC Regular" panose="03000300000000000000" charset="-122"/>
+                  <a:ea typeface="HanziPen SC Regular" panose="03000300000000000000" charset="-122"/>
+                </a:rPr>
+                <a:t>PEG.js</a:t>
               </a:r>
               <a:endParaRPr lang="zh-CN" altLang="en-US" sz="2400">
                 <a:solidFill>

</xml_diff>

<commit_message>
add react ssr selection hydrate
</commit_message>
<xml_diff>
--- a/公众号封面.pptx
+++ b/公众号封面.pptx
@@ -5,13 +5,14 @@
     <p:sldMasterId id="2147483648" r:id="rId1"/>
   </p:sldMasterIdLst>
   <p:notesMasterIdLst>
-    <p:notesMasterId r:id="rId7"/>
+    <p:notesMasterId r:id="rId8"/>
   </p:notesMasterIdLst>
   <p:sldIdLst>
     <p:sldId id="281" r:id="rId3"/>
     <p:sldId id="282" r:id="rId4"/>
     <p:sldId id="283" r:id="rId5"/>
     <p:sldId id="284" r:id="rId6"/>
+    <p:sldId id="285" r:id="rId7"/>
   </p:sldIdLst>
   <p:sldSz cx="12192000" cy="6858000"/>
   <p:notesSz cx="6858000" cy="9144000"/>
@@ -4415,6 +4416,167 @@
 </p:sld>
 </file>
 
+<file path=ppt/slides/slide5.xml><?xml version="1.0" encoding="utf-8"?>
+<p:sld xmlns:a="http://schemas.openxmlformats.org/drawingml/2006/main" xmlns:r="http://schemas.openxmlformats.org/officeDocument/2006/relationships" xmlns:p="http://schemas.openxmlformats.org/presentationml/2006/main">
+  <p:cSld>
+    <p:spTree>
+      <p:nvGrpSpPr>
+        <p:cNvPr id="1" name=""/>
+        <p:cNvGrpSpPr/>
+        <p:nvPr/>
+      </p:nvGrpSpPr>
+      <p:grpSpPr/>
+      <p:sp>
+        <p:nvSpPr>
+          <p:cNvPr id="3" name="矩形 2"/>
+          <p:cNvSpPr/>
+          <p:nvPr/>
+        </p:nvSpPr>
+        <p:spPr>
+          <a:xfrm>
+            <a:off x="2765425" y="1481455"/>
+            <a:ext cx="5781040" cy="2459990"/>
+          </a:xfrm>
+          <a:prstGeom prst="rect">
+            <a:avLst/>
+          </a:prstGeom>
+          <a:solidFill>
+            <a:schemeClr val="accent4">
+              <a:lumMod val="40000"/>
+              <a:lumOff val="60000"/>
+            </a:schemeClr>
+          </a:solidFill>
+          <a:ln>
+            <a:noFill/>
+          </a:ln>
+        </p:spPr>
+        <p:style>
+          <a:lnRef idx="2">
+            <a:schemeClr val="accent1">
+              <a:shade val="50000"/>
+            </a:schemeClr>
+          </a:lnRef>
+          <a:fillRef idx="1">
+            <a:schemeClr val="accent1"/>
+          </a:fillRef>
+          <a:effectRef idx="0">
+            <a:schemeClr val="accent1"/>
+          </a:effectRef>
+          <a:fontRef idx="minor">
+            <a:schemeClr val="lt1"/>
+          </a:fontRef>
+        </p:style>
+        <p:txBody>
+          <a:bodyPr rtlCol="0" anchor="ctr"/>
+          <a:p>
+            <a:pPr algn="ctr"/>
+            <a:endParaRPr lang="zh-CN" altLang="en-US"/>
+          </a:p>
+        </p:txBody>
+      </p:sp>
+      <p:pic>
+        <p:nvPicPr>
+          <p:cNvPr id="4" name="图片 3" descr="React"/>
+          <p:cNvPicPr>
+            <a:picLocks noChangeAspect="1"/>
+          </p:cNvPicPr>
+          <p:nvPr/>
+        </p:nvPicPr>
+        <p:blipFill>
+          <a:blip r:embed="rId1"/>
+          <a:stretch>
+            <a:fillRect/>
+          </a:stretch>
+        </p:blipFill>
+        <p:spPr>
+          <a:xfrm>
+            <a:off x="2868295" y="1910080"/>
+            <a:ext cx="1602740" cy="1602740"/>
+          </a:xfrm>
+          <a:prstGeom prst="rect">
+            <a:avLst/>
+          </a:prstGeom>
+        </p:spPr>
+      </p:pic>
+      <p:pic>
+        <p:nvPicPr>
+          <p:cNvPr id="9" name="图片 8" descr="picture-SSR - tokenbucket (3)"/>
+          <p:cNvPicPr>
+            <a:picLocks noChangeAspect="1"/>
+          </p:cNvPicPr>
+          <p:nvPr/>
+        </p:nvPicPr>
+        <p:blipFill>
+          <a:blip r:embed="rId2"/>
+          <a:stretch>
+            <a:fillRect/>
+          </a:stretch>
+        </p:blipFill>
+        <p:spPr>
+          <a:xfrm>
+            <a:off x="4471035" y="1964690"/>
+            <a:ext cx="1435100" cy="1492885"/>
+          </a:xfrm>
+          <a:prstGeom prst="rect">
+            <a:avLst/>
+          </a:prstGeom>
+        </p:spPr>
+      </p:pic>
+      <p:sp>
+        <p:nvSpPr>
+          <p:cNvPr id="10" name="文本框 9"/>
+          <p:cNvSpPr txBox="1"/>
+          <p:nvPr/>
+        </p:nvSpPr>
+        <p:spPr>
+          <a:xfrm>
+            <a:off x="6040755" y="2388870"/>
+            <a:ext cx="2384425" cy="645160"/>
+          </a:xfrm>
+          <a:prstGeom prst="rect">
+            <a:avLst/>
+          </a:prstGeom>
+          <a:noFill/>
+        </p:spPr>
+        <p:txBody>
+          <a:bodyPr wrap="none" rtlCol="0">
+            <a:spAutoFit/>
+          </a:bodyPr>
+          <a:p>
+            <a:r>
+              <a:rPr lang="en-US" altLang="zh-CN" sz="3600">
+                <a:latin typeface="Comic Sans MS Regular" panose="030F0902030302020204" charset="0"/>
+                <a:cs typeface="Comic Sans MS Regular" panose="030F0902030302020204" charset="0"/>
+              </a:rPr>
+              <a:t>Rate Limit</a:t>
+            </a:r>
+            <a:endParaRPr lang="en-US" altLang="zh-CN" sz="3600">
+              <a:latin typeface="Comic Sans MS Regular" panose="030F0902030302020204" charset="0"/>
+              <a:cs typeface="Comic Sans MS Regular" panose="030F0902030302020204" charset="0"/>
+            </a:endParaRPr>
+          </a:p>
+        </p:txBody>
+      </p:sp>
+    </p:spTree>
+  </p:cSld>
+  <p:clrMapOvr>
+    <a:masterClrMapping/>
+  </p:clrMapOvr>
+  <mc:AlternateContent xmlns:mc="http://schemas.openxmlformats.org/markup-compatibility/2006">
+    <mc:Choice xmlns:p14="http://schemas.microsoft.com/office/powerpoint/2010/main" Requires="p14">
+      <p:transition spd="slow" p14:dur="1500" advClick="0" advTm="0">
+        <p:random/>
+      </p:transition>
+    </mc:Choice>
+    <mc:Fallback>
+      <p:transition spd="slow" advClick="0" advTm="0">
+        <p:random/>
+      </p:transition>
+    </mc:Fallback>
+  </mc:AlternateContent>
+</p:sld>
+</file>
+
 <file path=ppt/theme/theme1.xml><?xml version="1.0" encoding="utf-8"?>
 <a:theme xmlns:a="http://schemas.openxmlformats.org/drawingml/2006/main" name="Office 主题​​">
   <a:themeElements>

</xml_diff>

<commit_message>
update react ssr selection hydrate
</commit_message>
<xml_diff>
--- a/公众号封面.pptx
+++ b/公众号封面.pptx
@@ -5,7 +5,7 @@
     <p:sldMasterId id="2147483648" r:id="rId1"/>
   </p:sldMasterIdLst>
   <p:notesMasterIdLst>
-    <p:notesMasterId r:id="rId8"/>
+    <p:notesMasterId r:id="rId9"/>
   </p:notesMasterIdLst>
   <p:sldIdLst>
     <p:sldId id="281" r:id="rId3"/>
@@ -13,6 +13,7 @@
     <p:sldId id="283" r:id="rId5"/>
     <p:sldId id="284" r:id="rId6"/>
     <p:sldId id="285" r:id="rId7"/>
+    <p:sldId id="286" r:id="rId8"/>
   </p:sldIdLst>
   <p:sldSz cx="12192000" cy="6858000"/>
   <p:notesSz cx="6858000" cy="9144000"/>
@@ -4577,6 +4578,187 @@
 </p:sld>
 </file>
 
+<file path=ppt/slides/slide6.xml><?xml version="1.0" encoding="utf-8"?>
+<p:sld xmlns:a="http://schemas.openxmlformats.org/drawingml/2006/main" xmlns:r="http://schemas.openxmlformats.org/officeDocument/2006/relationships" xmlns:p="http://schemas.openxmlformats.org/presentationml/2006/main">
+  <p:cSld>
+    <p:spTree>
+      <p:nvGrpSpPr>
+        <p:cNvPr id="1" name=""/>
+        <p:cNvGrpSpPr/>
+        <p:nvPr/>
+      </p:nvGrpSpPr>
+      <p:grpSpPr/>
+      <p:sp>
+        <p:nvSpPr>
+          <p:cNvPr id="3" name="矩形 2"/>
+          <p:cNvSpPr/>
+          <p:nvPr/>
+        </p:nvSpPr>
+        <p:spPr>
+          <a:xfrm>
+            <a:off x="2765425" y="1481455"/>
+            <a:ext cx="5781040" cy="2459990"/>
+          </a:xfrm>
+          <a:prstGeom prst="rect">
+            <a:avLst/>
+          </a:prstGeom>
+          <a:solidFill>
+            <a:srgbClr val="000080"/>
+          </a:solidFill>
+          <a:ln>
+            <a:noFill/>
+          </a:ln>
+        </p:spPr>
+        <p:style>
+          <a:lnRef idx="2">
+            <a:schemeClr val="accent1">
+              <a:shade val="50000"/>
+            </a:schemeClr>
+          </a:lnRef>
+          <a:fillRef idx="1">
+            <a:schemeClr val="accent1"/>
+          </a:fillRef>
+          <a:effectRef idx="0">
+            <a:schemeClr val="accent1"/>
+          </a:effectRef>
+          <a:fontRef idx="minor">
+            <a:schemeClr val="lt1"/>
+          </a:fontRef>
+        </p:style>
+        <p:txBody>
+          <a:bodyPr rtlCol="0" anchor="ctr"/>
+          <a:p>
+            <a:pPr algn="ctr"/>
+            <a:endParaRPr lang="zh-CN" altLang="en-US"/>
+          </a:p>
+        </p:txBody>
+      </p:sp>
+      <p:pic>
+        <p:nvPicPr>
+          <p:cNvPr id="4" name="图片 3" descr="React"/>
+          <p:cNvPicPr>
+            <a:picLocks noChangeAspect="1"/>
+          </p:cNvPicPr>
+          <p:nvPr/>
+        </p:nvPicPr>
+        <p:blipFill>
+          <a:blip r:embed="rId1"/>
+          <a:stretch>
+            <a:fillRect/>
+          </a:stretch>
+        </p:blipFill>
+        <p:spPr>
+          <a:xfrm>
+            <a:off x="2868295" y="1910080"/>
+            <a:ext cx="1602740" cy="1602740"/>
+          </a:xfrm>
+          <a:prstGeom prst="rect">
+            <a:avLst/>
+          </a:prstGeom>
+        </p:spPr>
+      </p:pic>
+      <p:sp>
+        <p:nvSpPr>
+          <p:cNvPr id="10" name="文本框 9"/>
+          <p:cNvSpPr txBox="1"/>
+          <p:nvPr/>
+        </p:nvSpPr>
+        <p:spPr>
+          <a:xfrm>
+            <a:off x="4370705" y="1802765"/>
+            <a:ext cx="3806190" cy="583565"/>
+          </a:xfrm>
+          <a:prstGeom prst="rect">
+            <a:avLst/>
+          </a:prstGeom>
+          <a:noFill/>
+        </p:spPr>
+        <p:txBody>
+          <a:bodyPr wrap="none" rtlCol="0">
+            <a:spAutoFit/>
+          </a:bodyPr>
+          <a:p>
+            <a:r>
+              <a:rPr lang="en-US" altLang="zh-CN" sz="3200">
+                <a:solidFill>
+                  <a:schemeClr val="bg1"/>
+                </a:solidFill>
+                <a:latin typeface="Comic Sans MS Regular" panose="030F0902030302020204" charset="0"/>
+                <a:cs typeface="Comic Sans MS Regular" panose="030F0902030302020204" charset="0"/>
+              </a:rPr>
+              <a:t>Streaming Rrender</a:t>
+            </a:r>
+            <a:endParaRPr lang="en-US" altLang="zh-CN" sz="3200">
+              <a:solidFill>
+                <a:schemeClr val="bg1"/>
+              </a:solidFill>
+              <a:latin typeface="Comic Sans MS Regular" panose="030F0902030302020204" charset="0"/>
+              <a:cs typeface="Comic Sans MS Regular" panose="030F0902030302020204" charset="0"/>
+            </a:endParaRPr>
+          </a:p>
+        </p:txBody>
+      </p:sp>
+      <p:sp>
+        <p:nvSpPr>
+          <p:cNvPr id="2" name="文本框 1"/>
+          <p:cNvSpPr txBox="1"/>
+          <p:nvPr/>
+        </p:nvSpPr>
+        <p:spPr>
+          <a:xfrm>
+            <a:off x="4282440" y="2843530"/>
+            <a:ext cx="3982720" cy="583565"/>
+          </a:xfrm>
+          <a:prstGeom prst="rect">
+            <a:avLst/>
+          </a:prstGeom>
+          <a:noFill/>
+        </p:spPr>
+        <p:txBody>
+          <a:bodyPr wrap="none" rtlCol="0">
+            <a:spAutoFit/>
+          </a:bodyPr>
+          <a:p>
+            <a:r>
+              <a:rPr lang="en-US" altLang="zh-CN" sz="3200">
+                <a:solidFill>
+                  <a:schemeClr val="bg1"/>
+                </a:solidFill>
+                <a:latin typeface="Comic Sans MS Regular" panose="030F0902030302020204" charset="0"/>
+                <a:cs typeface="Comic Sans MS Regular" panose="030F0902030302020204" charset="0"/>
+              </a:rPr>
+              <a:t>Selection Hydration</a:t>
+            </a:r>
+            <a:endParaRPr lang="en-US" altLang="zh-CN" sz="3200">
+              <a:solidFill>
+                <a:schemeClr val="bg1"/>
+              </a:solidFill>
+              <a:latin typeface="Comic Sans MS Regular" panose="030F0902030302020204" charset="0"/>
+              <a:cs typeface="Comic Sans MS Regular" panose="030F0902030302020204" charset="0"/>
+            </a:endParaRPr>
+          </a:p>
+        </p:txBody>
+      </p:sp>
+    </p:spTree>
+  </p:cSld>
+  <p:clrMapOvr>
+    <a:masterClrMapping/>
+  </p:clrMapOvr>
+  <mc:AlternateContent xmlns:mc="http://schemas.openxmlformats.org/markup-compatibility/2006">
+    <mc:Choice xmlns:p14="http://schemas.microsoft.com/office/powerpoint/2010/main" Requires="p14">
+      <p:transition spd="slow" p14:dur="1500" advClick="0" advTm="0">
+        <p:random/>
+      </p:transition>
+    </mc:Choice>
+    <mc:Fallback>
+      <p:transition spd="slow" advClick="0" advTm="0">
+        <p:random/>
+      </p:transition>
+    </mc:Fallback>
+  </mc:AlternateContent>
+</p:sld>
+</file>
+
 <file path=ppt/theme/theme1.xml><?xml version="1.0" encoding="utf-8"?>
 <a:theme xmlns:a="http://schemas.openxmlformats.org/drawingml/2006/main" name="Office 主题​​">
   <a:themeElements>

</xml_diff>

<commit_message>
add react server component
</commit_message>
<xml_diff>
--- a/公众号封面.pptx
+++ b/公众号封面.pptx
@@ -5,7 +5,7 @@
     <p:sldMasterId id="2147483648" r:id="rId1"/>
   </p:sldMasterIdLst>
   <p:notesMasterIdLst>
-    <p:notesMasterId r:id="rId15"/>
+    <p:notesMasterId r:id="rId16"/>
   </p:notesMasterIdLst>
   <p:sldIdLst>
     <p:sldId id="281" r:id="rId3"/>
@@ -20,6 +20,7 @@
     <p:sldId id="289" r:id="rId12"/>
     <p:sldId id="293" r:id="rId13"/>
     <p:sldId id="294" r:id="rId14"/>
+    <p:sldId id="295" r:id="rId15"/>
   </p:sldIdLst>
   <p:sldSz cx="12192000" cy="6858000"/>
   <p:notesSz cx="6858000" cy="9144000"/>
@@ -4291,6 +4292,188 @@
 </p:sld>
 </file>
 
+<file path=ppt/slides/slide13.xml><?xml version="1.0" encoding="utf-8"?>
+<p:sld xmlns:a="http://schemas.openxmlformats.org/drawingml/2006/main" xmlns:r="http://schemas.openxmlformats.org/officeDocument/2006/relationships" xmlns:p="http://schemas.openxmlformats.org/presentationml/2006/main">
+  <p:cSld>
+    <p:spTree>
+      <p:nvGrpSpPr>
+        <p:cNvPr id="1" name=""/>
+        <p:cNvGrpSpPr/>
+        <p:nvPr/>
+      </p:nvGrpSpPr>
+      <p:grpSpPr/>
+      <p:grpSp>
+        <p:nvGrpSpPr>
+          <p:cNvPr id="4" name="组合 3"/>
+          <p:cNvGrpSpPr/>
+          <p:nvPr/>
+        </p:nvGrpSpPr>
+        <p:grpSpPr>
+          <a:xfrm>
+            <a:off x="2765425" y="1481455"/>
+            <a:ext cx="5781040" cy="2459990"/>
+            <a:chOff x="4355" y="2333"/>
+            <a:chExt cx="9104" cy="3874"/>
+          </a:xfrm>
+        </p:grpSpPr>
+        <p:sp>
+          <p:nvSpPr>
+            <p:cNvPr id="3" name="矩形 2"/>
+            <p:cNvSpPr/>
+            <p:nvPr/>
+          </p:nvSpPr>
+          <p:spPr>
+            <a:xfrm>
+              <a:off x="4355" y="2333"/>
+              <a:ext cx="9104" cy="3874"/>
+            </a:xfrm>
+            <a:prstGeom prst="rect">
+              <a:avLst/>
+            </a:prstGeom>
+            <a:solidFill>
+              <a:srgbClr val="F55555"/>
+            </a:solidFill>
+            <a:ln>
+              <a:noFill/>
+            </a:ln>
+          </p:spPr>
+          <p:style>
+            <a:lnRef idx="2">
+              <a:schemeClr val="accent1">
+                <a:shade val="50000"/>
+              </a:schemeClr>
+            </a:lnRef>
+            <a:fillRef idx="1">
+              <a:schemeClr val="accent1"/>
+            </a:fillRef>
+            <a:effectRef idx="0">
+              <a:schemeClr val="accent1"/>
+            </a:effectRef>
+            <a:fontRef idx="minor">
+              <a:schemeClr val="lt1"/>
+            </a:fontRef>
+          </p:style>
+          <p:txBody>
+            <a:bodyPr rtlCol="0" anchor="ctr"/>
+            <a:p>
+              <a:pPr algn="ctr"/>
+              <a:endParaRPr lang="zh-CN" altLang="en-US"/>
+            </a:p>
+          </p:txBody>
+        </p:sp>
+        <p:sp>
+          <p:nvSpPr>
+            <p:cNvPr id="10" name="文本框 9"/>
+            <p:cNvSpPr txBox="1"/>
+            <p:nvPr/>
+          </p:nvSpPr>
+          <p:spPr>
+            <a:xfrm>
+              <a:off x="4896" y="3037"/>
+              <a:ext cx="8022" cy="1210"/>
+            </a:xfrm>
+            <a:prstGeom prst="rect">
+              <a:avLst/>
+            </a:prstGeom>
+            <a:noFill/>
+          </p:spPr>
+          <p:txBody>
+            <a:bodyPr wrap="none" rtlCol="0">
+              <a:spAutoFit/>
+            </a:bodyPr>
+            <a:p>
+              <a:r>
+                <a:rPr lang="en-US" altLang="zh-CN" sz="4400" b="1">
+                  <a:solidFill>
+                    <a:schemeClr val="bg1"/>
+                  </a:solidFill>
+                  <a:latin typeface="Comic Sans MS Bold" panose="030F0702030302020204" charset="0"/>
+                  <a:cs typeface="Comic Sans MS Bold" panose="030F0702030302020204" charset="0"/>
+                </a:rPr>
+                <a:t>Node.js Advance</a:t>
+              </a:r>
+              <a:r>
+                <a:rPr lang="en-US" altLang="zh-CN" sz="4400" b="1">
+                  <a:solidFill>
+                    <a:schemeClr val="bg1"/>
+                  </a:solidFill>
+                  <a:latin typeface="Comic Sans MS Bold" panose="030F0702030302020204" charset="0"/>
+                  <a:cs typeface="Comic Sans MS Bold" panose="030F0702030302020204" charset="0"/>
+                </a:rPr>
+                <a:t>d</a:t>
+              </a:r>
+              <a:endParaRPr lang="en-US" altLang="zh-CN" sz="4400" b="1">
+                <a:solidFill>
+                  <a:schemeClr val="bg1"/>
+                </a:solidFill>
+                <a:latin typeface="Comic Sans MS Bold" panose="030F0702030302020204" charset="0"/>
+                <a:cs typeface="Comic Sans MS Bold" panose="030F0702030302020204" charset="0"/>
+              </a:endParaRPr>
+            </a:p>
+          </p:txBody>
+        </p:sp>
+        <p:sp>
+          <p:nvSpPr>
+            <p:cNvPr id="2" name="文本框 1"/>
+            <p:cNvSpPr txBox="1"/>
+            <p:nvPr/>
+          </p:nvSpPr>
+          <p:spPr>
+            <a:xfrm>
+              <a:off x="7975" y="4601"/>
+              <a:ext cx="2040" cy="1210"/>
+            </a:xfrm>
+            <a:prstGeom prst="rect">
+              <a:avLst/>
+            </a:prstGeom>
+            <a:noFill/>
+          </p:spPr>
+          <p:txBody>
+            <a:bodyPr wrap="none" rtlCol="0">
+              <a:spAutoFit/>
+            </a:bodyPr>
+            <a:p>
+              <a:r>
+                <a:rPr lang="en-US" altLang="zh-CN" sz="4400" b="1">
+                  <a:solidFill>
+                    <a:srgbClr val="4F383E"/>
+                  </a:solidFill>
+                  <a:latin typeface="Comic Sans MS Bold" panose="030F0702030302020204" charset="0"/>
+                  <a:cs typeface="Comic Sans MS Bold" panose="030F0702030302020204" charset="0"/>
+                </a:rPr>
+                <a:t>UDP</a:t>
+              </a:r>
+              <a:endParaRPr lang="en-US" altLang="zh-CN" sz="4400" b="1">
+                <a:solidFill>
+                  <a:srgbClr val="4F383E"/>
+                </a:solidFill>
+                <a:latin typeface="Comic Sans MS Bold" panose="030F0702030302020204" charset="0"/>
+                <a:cs typeface="Comic Sans MS Bold" panose="030F0702030302020204" charset="0"/>
+              </a:endParaRPr>
+            </a:p>
+          </p:txBody>
+        </p:sp>
+      </p:grpSp>
+    </p:spTree>
+  </p:cSld>
+  <p:clrMapOvr>
+    <a:masterClrMapping/>
+  </p:clrMapOvr>
+  <mc:AlternateContent xmlns:mc="http://schemas.openxmlformats.org/markup-compatibility/2006">
+    <mc:Choice xmlns:p14="http://schemas.microsoft.com/office/powerpoint/2010/main" Requires="p14">
+      <p:transition spd="slow" p14:dur="1500" advClick="0" advTm="0">
+        <p:random/>
+      </p:transition>
+    </mc:Choice>
+    <mc:Fallback>
+      <p:transition spd="slow" advClick="0" advTm="0">
+        <p:random/>
+      </p:transition>
+    </mc:Fallback>
+  </mc:AlternateContent>
+</p:sld>
+</file>
+
 <file path=ppt/slides/slide2.xml><?xml version="1.0" encoding="utf-8"?>
 <p:sld xmlns:a="http://schemas.openxmlformats.org/drawingml/2006/main" xmlns:r="http://schemas.openxmlformats.org/officeDocument/2006/relationships" xmlns:p="http://schemas.openxmlformats.org/presentationml/2006/main">
   <p:cSld>

</xml_diff>

<commit_message>
add nodejs http agent
</commit_message>
<xml_diff>
--- a/公众号封面.pptx
+++ b/公众号封面.pptx
@@ -5,7 +5,7 @@
     <p:sldMasterId id="2147483648" r:id="rId1"/>
   </p:sldMasterIdLst>
   <p:notesMasterIdLst>
-    <p:notesMasterId r:id="rId20"/>
+    <p:notesMasterId r:id="rId21"/>
   </p:notesMasterIdLst>
   <p:sldIdLst>
     <p:sldId id="281" r:id="rId3"/>
@@ -17,14 +17,15 @@
     <p:sldId id="287" r:id="rId9"/>
     <p:sldId id="288" r:id="rId10"/>
     <p:sldId id="303" r:id="rId11"/>
-    <p:sldId id="291" r:id="rId12"/>
-    <p:sldId id="289" r:id="rId13"/>
-    <p:sldId id="293" r:id="rId14"/>
-    <p:sldId id="298" r:id="rId15"/>
-    <p:sldId id="294" r:id="rId16"/>
-    <p:sldId id="295" r:id="rId17"/>
-    <p:sldId id="296" r:id="rId18"/>
-    <p:sldId id="297" r:id="rId19"/>
+    <p:sldId id="312" r:id="rId12"/>
+    <p:sldId id="291" r:id="rId13"/>
+    <p:sldId id="289" r:id="rId14"/>
+    <p:sldId id="293" r:id="rId15"/>
+    <p:sldId id="298" r:id="rId16"/>
+    <p:sldId id="294" r:id="rId17"/>
+    <p:sldId id="295" r:id="rId18"/>
+    <p:sldId id="296" r:id="rId19"/>
+    <p:sldId id="297" r:id="rId20"/>
   </p:sldIdLst>
   <p:sldSz cx="12192000" cy="6858000"/>
   <p:notesSz cx="6858000" cy="9144000"/>
@@ -3763,6 +3764,196 @@
             <a:gradFill>
               <a:gsLst>
                 <a:gs pos="14000">
+                  <a:srgbClr val="77EFD8"/>
+                </a:gs>
+                <a:gs pos="87000">
+                  <a:srgbClr val="45BAF2"/>
+                </a:gs>
+              </a:gsLst>
+              <a:lin ang="2700000" scaled="0"/>
+            </a:gradFill>
+            <a:ln>
+              <a:noFill/>
+            </a:ln>
+          </p:spPr>
+          <p:style>
+            <a:lnRef idx="2">
+              <a:schemeClr val="accent1">
+                <a:shade val="50000"/>
+              </a:schemeClr>
+            </a:lnRef>
+            <a:fillRef idx="1">
+              <a:schemeClr val="accent1"/>
+            </a:fillRef>
+            <a:effectRef idx="0">
+              <a:schemeClr val="accent1"/>
+            </a:effectRef>
+            <a:fontRef idx="minor">
+              <a:schemeClr val="lt1"/>
+            </a:fontRef>
+          </p:style>
+          <p:txBody>
+            <a:bodyPr rtlCol="0" anchor="ctr"/>
+            <a:p>
+              <a:pPr algn="ctr"/>
+              <a:endParaRPr lang="zh-CN" altLang="en-US"/>
+            </a:p>
+          </p:txBody>
+        </p:sp>
+        <p:sp>
+          <p:nvSpPr>
+            <p:cNvPr id="10" name="文本框 9"/>
+            <p:cNvSpPr txBox="1"/>
+            <p:nvPr/>
+          </p:nvSpPr>
+          <p:spPr>
+            <a:xfrm>
+              <a:off x="5203" y="3008"/>
+              <a:ext cx="8022" cy="1210"/>
+            </a:xfrm>
+            <a:prstGeom prst="rect">
+              <a:avLst/>
+            </a:prstGeom>
+            <a:noFill/>
+          </p:spPr>
+          <p:txBody>
+            <a:bodyPr wrap="none" rtlCol="0">
+              <a:spAutoFit/>
+            </a:bodyPr>
+            <a:p>
+              <a:r>
+                <a:rPr lang="en-US" altLang="zh-CN" sz="4400" b="1">
+                  <a:solidFill>
+                    <a:schemeClr val="bg1"/>
+                  </a:solidFill>
+                  <a:latin typeface="Comic Sans MS Bold" panose="030F0702030302020204" charset="0"/>
+                  <a:cs typeface="Comic Sans MS Bold" panose="030F0702030302020204" charset="0"/>
+                </a:rPr>
+                <a:t>Node.js </a:t>
+              </a:r>
+              <a:r>
+                <a:rPr lang="en-US" altLang="zh-CN" sz="4400" b="1">
+                  <a:solidFill>
+                    <a:schemeClr val="bg1"/>
+                  </a:solidFill>
+                  <a:latin typeface="Comic Sans MS Bold" panose="030F0702030302020204" charset="0"/>
+                  <a:cs typeface="Comic Sans MS Bold" panose="030F0702030302020204" charset="0"/>
+                </a:rPr>
+                <a:t>Advanced</a:t>
+              </a:r>
+              <a:endParaRPr lang="en-US" altLang="zh-CN" sz="4400" b="1">
+                <a:solidFill>
+                  <a:schemeClr val="bg1"/>
+                </a:solidFill>
+                <a:latin typeface="Comic Sans MS Bold" panose="030F0702030302020204" charset="0"/>
+                <a:cs typeface="Comic Sans MS Bold" panose="030F0702030302020204" charset="0"/>
+              </a:endParaRPr>
+            </a:p>
+          </p:txBody>
+        </p:sp>
+        <p:sp>
+          <p:nvSpPr>
+            <p:cNvPr id="2" name="文本框 1"/>
+            <p:cNvSpPr txBox="1"/>
+            <p:nvPr/>
+          </p:nvSpPr>
+          <p:spPr>
+            <a:xfrm>
+              <a:off x="6735" y="4576"/>
+              <a:ext cx="4958" cy="1210"/>
+            </a:xfrm>
+            <a:prstGeom prst="rect">
+              <a:avLst/>
+            </a:prstGeom>
+            <a:noFill/>
+          </p:spPr>
+          <p:txBody>
+            <a:bodyPr wrap="none" rtlCol="0">
+              <a:spAutoFit/>
+            </a:bodyPr>
+            <a:p>
+              <a:r>
+                <a:rPr lang="en-US" altLang="zh-CN" sz="4400" b="1">
+                  <a:solidFill>
+                    <a:srgbClr val="FEB692"/>
+                  </a:solidFill>
+                  <a:latin typeface="Comic Sans MS Bold" panose="030F0702030302020204" charset="0"/>
+                  <a:cs typeface="Comic Sans MS Bold" panose="030F0702030302020204" charset="0"/>
+                </a:rPr>
+                <a:t>http.Agent</a:t>
+              </a:r>
+              <a:endParaRPr lang="zh-CN" altLang="en-US" sz="4400" b="1">
+                <a:solidFill>
+                  <a:srgbClr val="FEB692"/>
+                </a:solidFill>
+                <a:latin typeface="Comic Sans MS Bold" panose="030F0702030302020204" charset="0"/>
+                <a:cs typeface="Comic Sans MS Bold" panose="030F0702030302020204" charset="0"/>
+              </a:endParaRPr>
+            </a:p>
+          </p:txBody>
+        </p:sp>
+      </p:grpSp>
+    </p:spTree>
+  </p:cSld>
+  <p:clrMapOvr>
+    <a:masterClrMapping/>
+  </p:clrMapOvr>
+  <mc:AlternateContent xmlns:mc="http://schemas.openxmlformats.org/markup-compatibility/2006">
+    <mc:Choice xmlns:p14="http://schemas.microsoft.com/office/powerpoint/2010/main" Requires="p14">
+      <p:transition spd="slow" p14:dur="1500" advClick="0" advTm="0">
+        <p:random/>
+      </p:transition>
+    </mc:Choice>
+    <mc:Fallback>
+      <p:transition spd="slow" advClick="0" advTm="0">
+        <p:random/>
+      </p:transition>
+    </mc:Fallback>
+  </mc:AlternateContent>
+</p:sld>
+</file>
+
+<file path=ppt/slides/slide11.xml><?xml version="1.0" encoding="utf-8"?>
+<p:sld xmlns:a="http://schemas.openxmlformats.org/drawingml/2006/main" xmlns:r="http://schemas.openxmlformats.org/officeDocument/2006/relationships" xmlns:p="http://schemas.openxmlformats.org/presentationml/2006/main">
+  <p:cSld>
+    <p:spTree>
+      <p:nvGrpSpPr>
+        <p:cNvPr id="1" name=""/>
+        <p:cNvGrpSpPr/>
+        <p:nvPr/>
+      </p:nvGrpSpPr>
+      <p:grpSpPr/>
+      <p:grpSp>
+        <p:nvGrpSpPr>
+          <p:cNvPr id="4" name="组合 3"/>
+          <p:cNvGrpSpPr/>
+          <p:nvPr/>
+        </p:nvGrpSpPr>
+        <p:grpSpPr>
+          <a:xfrm>
+            <a:off x="2765425" y="1481455"/>
+            <a:ext cx="5781040" cy="2459990"/>
+            <a:chOff x="4355" y="2333"/>
+            <a:chExt cx="9104" cy="3874"/>
+          </a:xfrm>
+        </p:grpSpPr>
+        <p:sp>
+          <p:nvSpPr>
+            <p:cNvPr id="3" name="矩形 2"/>
+            <p:cNvSpPr/>
+            <p:nvPr/>
+          </p:nvSpPr>
+          <p:spPr>
+            <a:xfrm>
+              <a:off x="4355" y="2333"/>
+              <a:ext cx="9104" cy="3874"/>
+            </a:xfrm>
+            <a:prstGeom prst="rect">
+              <a:avLst/>
+            </a:prstGeom>
+            <a:gradFill>
+              <a:gsLst>
+                <a:gs pos="14000">
                   <a:srgbClr val="FF7AF5"/>
                 </a:gs>
                 <a:gs pos="87000">
@@ -3912,7 +4103,7 @@
 </p:sld>
 </file>
 
-<file path=ppt/slides/slide11.xml><?xml version="1.0" encoding="utf-8"?>
+<file path=ppt/slides/slide12.xml><?xml version="1.0" encoding="utf-8"?>
 <p:sld xmlns:a="http://schemas.openxmlformats.org/drawingml/2006/main" xmlns:r="http://schemas.openxmlformats.org/officeDocument/2006/relationships" xmlns:p="http://schemas.openxmlformats.org/presentationml/2006/main">
   <p:cSld>
     <p:spTree>
@@ -4093,7 +4284,7 @@
 </p:sld>
 </file>
 
-<file path=ppt/slides/slide12.xml><?xml version="1.0" encoding="utf-8"?>
+<file path=ppt/slides/slide13.xml><?xml version="1.0" encoding="utf-8"?>
 <p:sld xmlns:a="http://schemas.openxmlformats.org/drawingml/2006/main" xmlns:r="http://schemas.openxmlformats.org/officeDocument/2006/relationships" xmlns:p="http://schemas.openxmlformats.org/presentationml/2006/main">
   <p:cSld>
     <p:spTree>
@@ -4301,7 +4492,7 @@
 </p:sld>
 </file>
 
-<file path=ppt/slides/slide13.xml><?xml version="1.0" encoding="utf-8"?>
+<file path=ppt/slides/slide14.xml><?xml version="1.0" encoding="utf-8"?>
 <p:sld xmlns:a="http://schemas.openxmlformats.org/drawingml/2006/main" xmlns:r="http://schemas.openxmlformats.org/officeDocument/2006/relationships" xmlns:p="http://schemas.openxmlformats.org/presentationml/2006/main">
   <p:cSld>
     <p:spTree>
@@ -4484,7 +4675,7 @@
 </p:sld>
 </file>
 
-<file path=ppt/slides/slide14.xml><?xml version="1.0" encoding="utf-8"?>
+<file path=ppt/slides/slide15.xml><?xml version="1.0" encoding="utf-8"?>
 <p:sld xmlns:a="http://schemas.openxmlformats.org/drawingml/2006/main" xmlns:r="http://schemas.openxmlformats.org/officeDocument/2006/relationships" xmlns:p="http://schemas.openxmlformats.org/presentationml/2006/main">
   <p:cSld>
     <p:spTree>
@@ -4669,7 +4860,7 @@
 </p:sld>
 </file>
 
-<file path=ppt/slides/slide15.xml><?xml version="1.0" encoding="utf-8"?>
+<file path=ppt/slides/slide16.xml><?xml version="1.0" encoding="utf-8"?>
 <p:sld xmlns:a="http://schemas.openxmlformats.org/drawingml/2006/main" xmlns:r="http://schemas.openxmlformats.org/officeDocument/2006/relationships" xmlns:p="http://schemas.openxmlformats.org/presentationml/2006/main">
   <p:cSld>
     <p:spTree>
@@ -4851,7 +5042,7 @@
 </p:sld>
 </file>
 
-<file path=ppt/slides/slide16.xml><?xml version="1.0" encoding="utf-8"?>
+<file path=ppt/slides/slide17.xml><?xml version="1.0" encoding="utf-8"?>
 <p:sld xmlns:a="http://schemas.openxmlformats.org/drawingml/2006/main" xmlns:r="http://schemas.openxmlformats.org/officeDocument/2006/relationships" xmlns:p="http://schemas.openxmlformats.org/presentationml/2006/main">
   <p:cSld>
     <p:spTree>
@@ -5032,7 +5223,7 @@
 </p:sld>
 </file>
 
-<file path=ppt/slides/slide17.xml><?xml version="1.0" encoding="utf-8"?>
+<file path=ppt/slides/slide18.xml><?xml version="1.0" encoding="utf-8"?>
 <p:sld xmlns:a="http://schemas.openxmlformats.org/drawingml/2006/main" xmlns:r="http://schemas.openxmlformats.org/officeDocument/2006/relationships" xmlns:p="http://schemas.openxmlformats.org/presentationml/2006/main">
   <p:cSld>
     <p:spTree>

</xml_diff>

<commit_message>
add factory design pattern
</commit_message>
<xml_diff>
--- a/公众号封面.pptx
+++ b/公众号封面.pptx
@@ -7038,8 +7038,8 @@
           </p:nvSpPr>
           <p:spPr>
             <a:xfrm>
-              <a:off x="6015" y="3008"/>
-              <a:ext cx="5784" cy="1210"/>
+              <a:off x="5625" y="3024"/>
+              <a:ext cx="6564" cy="1210"/>
             </a:xfrm>
             <a:prstGeom prst="rect">
               <a:avLst/>
@@ -7059,19 +7059,19 @@
                   <a:latin typeface="Comic Sans MS Bold" panose="030F0702030302020204" charset="0"/>
                   <a:cs typeface="Comic Sans MS Bold" panose="030F0702030302020204" charset="0"/>
                 </a:rPr>
-                <a:t>Node.js </a:t>
+                <a:t>Design </a:t>
               </a:r>
               <a:r>
-                <a:rPr lang="zh-CN" altLang="en-US" sz="4400" b="1">
+                <a:rPr lang="en-US" altLang="zh-CN" sz="4400" b="1">
                   <a:solidFill>
                     <a:schemeClr val="bg1"/>
                   </a:solidFill>
                   <a:latin typeface="Comic Sans MS Bold" panose="030F0702030302020204" charset="0"/>
                   <a:cs typeface="Comic Sans MS Bold" panose="030F0702030302020204" charset="0"/>
                 </a:rPr>
-                <a:t>实战</a:t>
+                <a:t>Pattern</a:t>
               </a:r>
-              <a:endParaRPr lang="zh-CN" altLang="en-US" sz="4400" b="1">
+              <a:endParaRPr lang="en-US" altLang="zh-CN" sz="4400" b="1">
                 <a:solidFill>
                   <a:schemeClr val="bg1"/>
                 </a:solidFill>
@@ -7089,8 +7089,8 @@
           </p:nvSpPr>
           <p:spPr>
             <a:xfrm>
-              <a:off x="7308" y="4601"/>
-              <a:ext cx="3812" cy="1210"/>
+              <a:off x="6835" y="4617"/>
+              <a:ext cx="4145" cy="1210"/>
             </a:xfrm>
             <a:prstGeom prst="rect">
               <a:avLst/>
@@ -7103,26 +7103,16 @@
             </a:bodyPr>
             <a:p>
               <a:r>
-                <a:rPr lang="zh-CN" altLang="en-US" sz="4400" b="1">
+                <a:rPr lang="en-US" altLang="zh-CN" sz="4400" b="1">
                   <a:solidFill>
                     <a:srgbClr val="FEB692"/>
                   </a:solidFill>
                   <a:latin typeface="Comic Sans MS Bold" panose="030F0702030302020204" charset="0"/>
                   <a:cs typeface="Comic Sans MS Bold" panose="030F0702030302020204" charset="0"/>
                 </a:rPr>
-                <a:t>灰度</a:t>
+                <a:t>Singleton</a:t>
               </a:r>
-              <a:r>
-                <a:rPr lang="zh-CN" altLang="en-US" sz="4400" b="1">
-                  <a:solidFill>
-                    <a:srgbClr val="FEB692"/>
-                  </a:solidFill>
-                  <a:latin typeface="Comic Sans MS Bold" panose="030F0702030302020204" charset="0"/>
-                  <a:cs typeface="Comic Sans MS Bold" panose="030F0702030302020204" charset="0"/>
-                </a:rPr>
-                <a:t>发布</a:t>
-              </a:r>
-              <a:endParaRPr lang="zh-CN" altLang="en-US" sz="4400" b="1">
+              <a:endParaRPr lang="en-US" altLang="zh-CN" sz="4400" b="1">
                 <a:solidFill>
                   <a:srgbClr val="FEB692"/>
                 </a:solidFill>

</xml_diff>

<commit_message>
add big react wasm 1
</commit_message>
<xml_diff>
--- a/公众号封面.pptx
+++ b/公众号封面.pptx
@@ -5,7 +5,7 @@
     <p:sldMasterId id="2147483648" r:id="rId1"/>
   </p:sldMasterIdLst>
   <p:notesMasterIdLst>
-    <p:notesMasterId r:id="rId22"/>
+    <p:notesMasterId r:id="rId23"/>
   </p:notesMasterIdLst>
   <p:sldIdLst>
     <p:sldId id="281" r:id="rId3"/>
@@ -26,7 +26,8 @@
     <p:sldId id="295" r:id="rId18"/>
     <p:sldId id="321" r:id="rId19"/>
     <p:sldId id="296" r:id="rId20"/>
-    <p:sldId id="297" r:id="rId21"/>
+    <p:sldId id="324" r:id="rId21"/>
+    <p:sldId id="297" r:id="rId22"/>
   </p:sldIdLst>
   <p:sldSz cx="12192000" cy="6858000"/>
   <p:notesSz cx="6858000" cy="9144000"/>
@@ -5374,169 +5375,162 @@
         <p:nvPr/>
       </p:nvGrpSpPr>
       <p:grpSpPr/>
-      <p:grpSp>
-        <p:nvGrpSpPr>
-          <p:cNvPr id="4" name="组合 3"/>
-          <p:cNvGrpSpPr/>
+      <p:sp>
+        <p:nvSpPr>
+          <p:cNvPr id="3" name="矩形 2"/>
+          <p:cNvSpPr/>
           <p:nvPr/>
-        </p:nvGrpSpPr>
-        <p:grpSpPr>
+        </p:nvSpPr>
+        <p:spPr>
           <a:xfrm>
             <a:off x="2765425" y="1481455"/>
             <a:ext cx="5781040" cy="2459990"/>
-            <a:chOff x="4355" y="2333"/>
-            <a:chExt cx="9104" cy="3874"/>
           </a:xfrm>
+          <a:prstGeom prst="rect">
+            <a:avLst/>
+          </a:prstGeom>
           <a:gradFill>
             <a:gsLst>
               <a:gs pos="0">
-                <a:srgbClr val="69FF97"/>
+                <a:srgbClr val="F7FF00"/>
               </a:gs>
               <a:gs pos="100000">
-                <a:srgbClr val="00E4FF"/>
+                <a:srgbClr val="DC37A4"/>
               </a:gs>
             </a:gsLst>
-            <a:lin ang="5400000" scaled="0"/>
+            <a:lin ang="0" scaled="0"/>
           </a:gradFill>
-        </p:grpSpPr>
-        <p:sp>
-          <p:nvSpPr>
-            <p:cNvPr id="3" name="矩形 2"/>
-            <p:cNvSpPr/>
-            <p:nvPr/>
-          </p:nvSpPr>
-          <p:spPr>
-            <a:xfrm>
-              <a:off x="4355" y="2333"/>
-              <a:ext cx="9104" cy="3874"/>
-            </a:xfrm>
-            <a:prstGeom prst="rect">
-              <a:avLst/>
-            </a:prstGeom>
-            <a:grpFill/>
-            <a:ln>
-              <a:noFill/>
-            </a:ln>
-          </p:spPr>
-          <p:style>
-            <a:lnRef idx="2">
-              <a:schemeClr val="accent1">
-                <a:shade val="50000"/>
-              </a:schemeClr>
-            </a:lnRef>
-            <a:fillRef idx="1">
-              <a:schemeClr val="accent1"/>
-            </a:fillRef>
-            <a:effectRef idx="0">
-              <a:schemeClr val="accent1"/>
-            </a:effectRef>
-            <a:fontRef idx="minor">
-              <a:schemeClr val="lt1"/>
-            </a:fontRef>
-          </p:style>
-          <p:txBody>
-            <a:bodyPr rtlCol="0" anchor="ctr"/>
-            <a:p>
-              <a:pPr algn="ctr"/>
-              <a:endParaRPr lang="zh-CN" altLang="en-US"/>
-            </a:p>
-          </p:txBody>
-        </p:sp>
-        <p:sp>
-          <p:nvSpPr>
-            <p:cNvPr id="10" name="文本框 9"/>
-            <p:cNvSpPr txBox="1"/>
-            <p:nvPr/>
-          </p:nvSpPr>
-          <p:spPr>
-            <a:xfrm>
-              <a:off x="6478" y="3037"/>
-              <a:ext cx="4864" cy="1210"/>
-            </a:xfrm>
-            <a:prstGeom prst="rect">
-              <a:avLst/>
-            </a:prstGeom>
-            <a:grpFill/>
-          </p:spPr>
-          <p:txBody>
-            <a:bodyPr wrap="none" rtlCol="0">
-              <a:spAutoFit/>
-            </a:bodyPr>
-            <a:p>
-              <a:pPr algn="ctr"/>
-              <a:r>
-                <a:rPr lang="en-US" altLang="zh-CN" sz="4400" b="1">
-                  <a:solidFill>
-                    <a:schemeClr val="bg1"/>
-                  </a:solidFill>
-                  <a:latin typeface="Comic Sans MS Bold" panose="030F0702030302020204" charset="0"/>
-                  <a:cs typeface="Comic Sans MS Bold" panose="030F0702030302020204" charset="0"/>
-                </a:rPr>
-                <a:t>React </a:t>
-              </a:r>
-              <a:r>
-                <a:rPr lang="en-US" altLang="zh-CN" sz="4400" b="1">
-                  <a:solidFill>
-                    <a:schemeClr val="bg1"/>
-                  </a:solidFill>
-                  <a:latin typeface="Comic Sans MS Bold" panose="030F0702030302020204" charset="0"/>
-                  <a:cs typeface="Comic Sans MS Bold" panose="030F0702030302020204" charset="0"/>
-                </a:rPr>
-                <a:t>SSR</a:t>
-              </a:r>
-              <a:endParaRPr lang="en-US" altLang="zh-CN" sz="4400" b="1">
-                <a:solidFill>
-                  <a:schemeClr val="bg1"/>
-                </a:solidFill>
-                <a:latin typeface="Comic Sans MS Bold" panose="030F0702030302020204" charset="0"/>
-                <a:cs typeface="Comic Sans MS Bold" panose="030F0702030302020204" charset="0"/>
-              </a:endParaRPr>
-            </a:p>
-          </p:txBody>
-        </p:sp>
-        <p:sp>
-          <p:nvSpPr>
-            <p:cNvPr id="2" name="文本框 1"/>
-            <p:cNvSpPr txBox="1"/>
-            <p:nvPr/>
-          </p:nvSpPr>
-          <p:spPr>
-            <a:xfrm>
-              <a:off x="7887" y="4601"/>
-              <a:ext cx="2050" cy="1210"/>
-            </a:xfrm>
-            <a:prstGeom prst="rect">
-              <a:avLst/>
-            </a:prstGeom>
-            <a:grpFill/>
-          </p:spPr>
-          <p:txBody>
-            <a:bodyPr wrap="none" rtlCol="0">
-              <a:spAutoFit/>
-            </a:bodyPr>
-            <a:p>
-              <a:pPr algn="ctr"/>
-              <a:r>
-                <a:rPr lang="zh-CN" altLang="en-US" sz="4400" b="1">
-                  <a:solidFill>
-                    <a:srgbClr val="4F383E"/>
-                  </a:solidFill>
-                  <a:latin typeface="Comic Sans MS Bold" panose="030F0702030302020204" charset="0"/>
-                  <a:cs typeface="Comic Sans MS Bold" panose="030F0702030302020204" charset="0"/>
-                </a:rPr>
-                <a:t>监控</a:t>
-              </a:r>
-              <a:endParaRPr lang="zh-CN" altLang="en-US" sz="4400" b="1">
+          <a:ln>
+            <a:noFill/>
+          </a:ln>
+        </p:spPr>
+        <p:style>
+          <a:lnRef idx="2">
+            <a:schemeClr val="accent1">
+              <a:shade val="50000"/>
+            </a:schemeClr>
+          </a:lnRef>
+          <a:fillRef idx="1">
+            <a:schemeClr val="accent1"/>
+          </a:fillRef>
+          <a:effectRef idx="0">
+            <a:schemeClr val="accent1"/>
+          </a:effectRef>
+          <a:fontRef idx="minor">
+            <a:schemeClr val="lt1"/>
+          </a:fontRef>
+        </p:style>
+        <p:txBody>
+          <a:bodyPr rtlCol="0" anchor="ctr"/>
+          <a:p>
+            <a:pPr algn="ctr"/>
+            <a:endParaRPr lang="zh-CN" altLang="en-US"/>
+          </a:p>
+        </p:txBody>
+      </p:sp>
+      <p:pic>
+        <p:nvPicPr>
+          <p:cNvPr id="5" name="图片 4"/>
+          <p:cNvPicPr>
+            <a:picLocks noChangeAspect="1"/>
+          </p:cNvPicPr>
+          <p:nvPr/>
+        </p:nvPicPr>
+        <p:blipFill>
+          <a:blip r:embed="rId1">
+            <a:alphaModFix amt="60000"/>
+          </a:blip>
+          <a:stretch>
+            <a:fillRect/>
+          </a:stretch>
+        </p:blipFill>
+        <p:spPr>
+          <a:xfrm>
+            <a:off x="3742690" y="2066290"/>
+            <a:ext cx="1488440" cy="1294765"/>
+          </a:xfrm>
+          <a:prstGeom prst="rect">
+            <a:avLst/>
+          </a:prstGeom>
+        </p:spPr>
+      </p:pic>
+      <p:pic>
+        <p:nvPicPr>
+          <p:cNvPr id="7" name="图片 6"/>
+          <p:cNvPicPr>
+            <a:picLocks noChangeAspect="1"/>
+          </p:cNvPicPr>
+          <p:nvPr/>
+        </p:nvPicPr>
+        <p:blipFill>
+          <a:blip r:embed="rId2">
+            <a:alphaModFix amt="60000"/>
+          </a:blip>
+          <a:stretch>
+            <a:fillRect/>
+          </a:stretch>
+        </p:blipFill>
+        <p:spPr>
+          <a:xfrm>
+            <a:off x="5521960" y="2066290"/>
+            <a:ext cx="2047240" cy="1290320"/>
+          </a:xfrm>
+          <a:prstGeom prst="rect">
+            <a:avLst/>
+          </a:prstGeom>
+        </p:spPr>
+      </p:pic>
+      <p:sp>
+        <p:nvSpPr>
+          <p:cNvPr id="6" name="文本框 5"/>
+          <p:cNvSpPr txBox="1"/>
+          <p:nvPr/>
+        </p:nvSpPr>
+        <p:spPr>
+          <a:xfrm>
+            <a:off x="3742055" y="2329815"/>
+            <a:ext cx="3827145" cy="768350"/>
+          </a:xfrm>
+          <a:prstGeom prst="rect">
+            <a:avLst/>
+          </a:prstGeom>
+          <a:noFill/>
+        </p:spPr>
+        <p:txBody>
+          <a:bodyPr wrap="none" rtlCol="0">
+            <a:spAutoFit/>
+          </a:bodyPr>
+          <a:p>
+            <a:r>
+              <a:rPr lang="en-US" altLang="zh-CN" sz="4400" b="1">
                 <a:solidFill>
                   <a:srgbClr val="4F383E"/>
                 </a:solidFill>
                 <a:latin typeface="Comic Sans MS Bold" panose="030F0702030302020204" charset="0"/>
                 <a:cs typeface="Comic Sans MS Bold" panose="030F0702030302020204" charset="0"/>
-              </a:endParaRPr>
-            </a:p>
-          </p:txBody>
-        </p:sp>
-      </p:grpSp>
+              </a:rPr>
+              <a:t>React </a:t>
+            </a:r>
+            <a:r>
+              <a:rPr lang="en-US" altLang="zh-CN" sz="4400" b="1">
+                <a:solidFill>
+                  <a:srgbClr val="4F383E"/>
+                </a:solidFill>
+                <a:latin typeface="Comic Sans MS Bold" panose="030F0702030302020204" charset="0"/>
+                <a:cs typeface="Comic Sans MS Bold" panose="030F0702030302020204" charset="0"/>
+              </a:rPr>
+              <a:t>WASM</a:t>
+            </a:r>
+            <a:endParaRPr lang="en-US" altLang="zh-CN" sz="4400" b="1">
+              <a:solidFill>
+                <a:srgbClr val="4F383E"/>
+              </a:solidFill>
+              <a:latin typeface="Comic Sans MS Bold" panose="030F0702030302020204" charset="0"/>
+              <a:cs typeface="Comic Sans MS Bold" panose="030F0702030302020204" charset="0"/>
+            </a:endParaRPr>
+          </a:p>
+        </p:txBody>
+      </p:sp>
     </p:spTree>
   </p:cSld>
   <p:clrMapOvr>
@@ -5752,6 +5746,199 @@
                 </a:effectLst>
                 <a:latin typeface="HanziPen SC Regular" panose="03000300000000000000" charset="-122"/>
                 <a:ea typeface="HanziPen SC Regular" panose="03000300000000000000" charset="-122"/>
+              </a:endParaRPr>
+            </a:p>
+          </p:txBody>
+        </p:sp>
+      </p:grpSp>
+    </p:spTree>
+  </p:cSld>
+  <p:clrMapOvr>
+    <a:masterClrMapping/>
+  </p:clrMapOvr>
+  <mc:AlternateContent xmlns:mc="http://schemas.openxmlformats.org/markup-compatibility/2006">
+    <mc:Choice xmlns:p14="http://schemas.microsoft.com/office/powerpoint/2010/main" Requires="p14">
+      <p:transition spd="slow" p14:dur="1500" advClick="0" advTm="0">
+        <p:random/>
+      </p:transition>
+    </mc:Choice>
+    <mc:Fallback>
+      <p:transition spd="slow" advClick="0" advTm="0">
+        <p:random/>
+      </p:transition>
+    </mc:Fallback>
+  </mc:AlternateContent>
+</p:sld>
+</file>
+
+<file path=ppt/slides/slide20.xml><?xml version="1.0" encoding="utf-8"?>
+<p:sld xmlns:a="http://schemas.openxmlformats.org/drawingml/2006/main" xmlns:r="http://schemas.openxmlformats.org/officeDocument/2006/relationships" xmlns:p="http://schemas.openxmlformats.org/presentationml/2006/main">
+  <p:cSld>
+    <p:spTree>
+      <p:nvGrpSpPr>
+        <p:cNvPr id="1" name=""/>
+        <p:cNvGrpSpPr/>
+        <p:nvPr/>
+      </p:nvGrpSpPr>
+      <p:grpSpPr/>
+      <p:grpSp>
+        <p:nvGrpSpPr>
+          <p:cNvPr id="4" name="组合 3"/>
+          <p:cNvGrpSpPr/>
+          <p:nvPr/>
+        </p:nvGrpSpPr>
+        <p:grpSpPr>
+          <a:xfrm>
+            <a:off x="2765425" y="1481455"/>
+            <a:ext cx="5781040" cy="2459990"/>
+            <a:chOff x="4355" y="2333"/>
+            <a:chExt cx="9104" cy="3874"/>
+          </a:xfrm>
+          <a:gradFill>
+            <a:gsLst>
+              <a:gs pos="0">
+                <a:srgbClr val="69FF97"/>
+              </a:gs>
+              <a:gs pos="100000">
+                <a:srgbClr val="00E4FF"/>
+              </a:gs>
+            </a:gsLst>
+            <a:lin ang="5400000" scaled="0"/>
+          </a:gradFill>
+        </p:grpSpPr>
+        <p:sp>
+          <p:nvSpPr>
+            <p:cNvPr id="3" name="矩形 2"/>
+            <p:cNvSpPr/>
+            <p:nvPr/>
+          </p:nvSpPr>
+          <p:spPr>
+            <a:xfrm>
+              <a:off x="4355" y="2333"/>
+              <a:ext cx="9104" cy="3874"/>
+            </a:xfrm>
+            <a:prstGeom prst="rect">
+              <a:avLst/>
+            </a:prstGeom>
+            <a:grpFill/>
+            <a:ln>
+              <a:noFill/>
+            </a:ln>
+          </p:spPr>
+          <p:style>
+            <a:lnRef idx="2">
+              <a:schemeClr val="accent1">
+                <a:shade val="50000"/>
+              </a:schemeClr>
+            </a:lnRef>
+            <a:fillRef idx="1">
+              <a:schemeClr val="accent1"/>
+            </a:fillRef>
+            <a:effectRef idx="0">
+              <a:schemeClr val="accent1"/>
+            </a:effectRef>
+            <a:fontRef idx="minor">
+              <a:schemeClr val="lt1"/>
+            </a:fontRef>
+          </p:style>
+          <p:txBody>
+            <a:bodyPr rtlCol="0" anchor="ctr"/>
+            <a:p>
+              <a:pPr algn="ctr"/>
+              <a:endParaRPr lang="zh-CN" altLang="en-US"/>
+            </a:p>
+          </p:txBody>
+        </p:sp>
+        <p:sp>
+          <p:nvSpPr>
+            <p:cNvPr id="10" name="文本框 9"/>
+            <p:cNvSpPr txBox="1"/>
+            <p:nvPr/>
+          </p:nvSpPr>
+          <p:spPr>
+            <a:xfrm>
+              <a:off x="6478" y="3037"/>
+              <a:ext cx="4864" cy="1210"/>
+            </a:xfrm>
+            <a:prstGeom prst="rect">
+              <a:avLst/>
+            </a:prstGeom>
+            <a:grpFill/>
+          </p:spPr>
+          <p:txBody>
+            <a:bodyPr wrap="none" rtlCol="0">
+              <a:spAutoFit/>
+            </a:bodyPr>
+            <a:p>
+              <a:pPr algn="ctr"/>
+              <a:r>
+                <a:rPr lang="en-US" altLang="zh-CN" sz="4400" b="1">
+                  <a:solidFill>
+                    <a:schemeClr val="bg1"/>
+                  </a:solidFill>
+                  <a:latin typeface="Comic Sans MS Bold" panose="030F0702030302020204" charset="0"/>
+                  <a:cs typeface="Comic Sans MS Bold" panose="030F0702030302020204" charset="0"/>
+                </a:rPr>
+                <a:t>React </a:t>
+              </a:r>
+              <a:r>
+                <a:rPr lang="en-US" altLang="zh-CN" sz="4400" b="1">
+                  <a:solidFill>
+                    <a:schemeClr val="bg1"/>
+                  </a:solidFill>
+                  <a:latin typeface="Comic Sans MS Bold" panose="030F0702030302020204" charset="0"/>
+                  <a:cs typeface="Comic Sans MS Bold" panose="030F0702030302020204" charset="0"/>
+                </a:rPr>
+                <a:t>SSR</a:t>
+              </a:r>
+              <a:endParaRPr lang="en-US" altLang="zh-CN" sz="4400" b="1">
+                <a:solidFill>
+                  <a:schemeClr val="bg1"/>
+                </a:solidFill>
+                <a:latin typeface="Comic Sans MS Bold" panose="030F0702030302020204" charset="0"/>
+                <a:cs typeface="Comic Sans MS Bold" panose="030F0702030302020204" charset="0"/>
+              </a:endParaRPr>
+            </a:p>
+          </p:txBody>
+        </p:sp>
+        <p:sp>
+          <p:nvSpPr>
+            <p:cNvPr id="2" name="文本框 1"/>
+            <p:cNvSpPr txBox="1"/>
+            <p:nvPr/>
+          </p:nvSpPr>
+          <p:spPr>
+            <a:xfrm>
+              <a:off x="7887" y="4601"/>
+              <a:ext cx="2050" cy="1210"/>
+            </a:xfrm>
+            <a:prstGeom prst="rect">
+              <a:avLst/>
+            </a:prstGeom>
+            <a:grpFill/>
+          </p:spPr>
+          <p:txBody>
+            <a:bodyPr wrap="none" rtlCol="0">
+              <a:spAutoFit/>
+            </a:bodyPr>
+            <a:p>
+              <a:pPr algn="ctr"/>
+              <a:r>
+                <a:rPr lang="zh-CN" altLang="en-US" sz="4400" b="1">
+                  <a:solidFill>
+                    <a:srgbClr val="4F383E"/>
+                  </a:solidFill>
+                  <a:latin typeface="Comic Sans MS Bold" panose="030F0702030302020204" charset="0"/>
+                  <a:cs typeface="Comic Sans MS Bold" panose="030F0702030302020204" charset="0"/>
+                </a:rPr>
+                <a:t>监控</a:t>
+              </a:r>
+              <a:endParaRPr lang="zh-CN" altLang="en-US" sz="4400" b="1">
+                <a:solidFill>
+                  <a:srgbClr val="4F383E"/>
+                </a:solidFill>
+                <a:latin typeface="Comic Sans MS Bold" panose="030F0702030302020204" charset="0"/>
+                <a:cs typeface="Comic Sans MS Bold" panose="030F0702030302020204" charset="0"/>
               </a:endParaRPr>
             </a:p>
           </p:txBody>
@@ -7089,8 +7276,8 @@
           </p:nvSpPr>
           <p:spPr>
             <a:xfrm>
-              <a:off x="7132" y="4617"/>
-              <a:ext cx="3550" cy="1210"/>
+              <a:off x="6715" y="4617"/>
+              <a:ext cx="4385" cy="1210"/>
             </a:xfrm>
             <a:prstGeom prst="rect">
               <a:avLst/>
@@ -7110,7 +7297,7 @@
                   <a:latin typeface="Comic Sans MS Bold" panose="030F0702030302020204" charset="0"/>
                   <a:cs typeface="Comic Sans MS Bold" panose="030F0702030302020204" charset="0"/>
                 </a:rPr>
-                <a:t>Factory</a:t>
+                <a:t>Prototype</a:t>
               </a:r>
               <a:endParaRPr lang="en-US" altLang="zh-CN" sz="4400" b="1">
                 <a:solidFill>

</xml_diff>

<commit_message>
add nodejs grayscale oom
</commit_message>
<xml_diff>
--- a/公众号封面.pptx
+++ b/公众号封面.pptx
@@ -5940,8 +5940,8 @@
           </p:nvSpPr>
           <p:spPr>
             <a:xfrm>
-              <a:off x="6478" y="3037"/>
-              <a:ext cx="4864" cy="1210"/>
+              <a:off x="7092" y="3037"/>
+              <a:ext cx="3640" cy="1210"/>
             </a:xfrm>
             <a:prstGeom prst="rect">
               <a:avLst/>
@@ -5962,17 +5962,7 @@
                   <a:latin typeface="Comic Sans MS Bold" panose="030F0702030302020204" charset="0"/>
                   <a:cs typeface="Comic Sans MS Bold" panose="030F0702030302020204" charset="0"/>
                 </a:rPr>
-                <a:t>React </a:t>
-              </a:r>
-              <a:r>
-                <a:rPr lang="en-US" altLang="zh-CN" sz="4400" b="1">
-                  <a:solidFill>
-                    <a:schemeClr val="bg1"/>
-                  </a:solidFill>
-                  <a:latin typeface="Comic Sans MS Bold" panose="030F0702030302020204" charset="0"/>
-                  <a:cs typeface="Comic Sans MS Bold" panose="030F0702030302020204" charset="0"/>
-                </a:rPr>
-                <a:t>SSR</a:t>
+                <a:t>Node.js</a:t>
               </a:r>
               <a:endParaRPr lang="en-US" altLang="zh-CN" sz="4400" b="1">
                 <a:solidFill>
@@ -5992,8 +5982,8 @@
           </p:nvSpPr>
           <p:spPr>
             <a:xfrm>
-              <a:off x="7887" y="4601"/>
-              <a:ext cx="2050" cy="1210"/>
+              <a:off x="7678" y="4601"/>
+              <a:ext cx="2471" cy="1210"/>
             </a:xfrm>
             <a:prstGeom prst="rect">
               <a:avLst/>
@@ -6007,16 +5997,16 @@
             <a:p>
               <a:pPr algn="ctr"/>
               <a:r>
-                <a:rPr lang="zh-CN" altLang="en-US" sz="4400" b="1">
+                <a:rPr lang="en-US" altLang="zh-CN" sz="4400" b="1">
                   <a:solidFill>
                     <a:srgbClr val="4F383E"/>
                   </a:solidFill>
                   <a:latin typeface="Comic Sans MS Bold" panose="030F0702030302020204" charset="0"/>
                   <a:cs typeface="Comic Sans MS Bold" panose="030F0702030302020204" charset="0"/>
                 </a:rPr>
-                <a:t>监控</a:t>
+                <a:t>OOM</a:t>
               </a:r>
-              <a:endParaRPr lang="zh-CN" altLang="en-US" sz="4400" b="1">
+              <a:endParaRPr lang="en-US" altLang="zh-CN" sz="4400" b="1">
                 <a:solidFill>
                   <a:srgbClr val="4F383E"/>
                 </a:solidFill>

</xml_diff>

<commit_message>
add rs webpack 1
</commit_message>
<xml_diff>
--- a/公众号封面.pptx
+++ b/公众号封面.pptx
@@ -5,7 +5,7 @@
     <p:sldMasterId id="2147483648" r:id="rId1"/>
   </p:sldMasterIdLst>
   <p:notesMasterIdLst>
-    <p:notesMasterId r:id="rId24"/>
+    <p:notesMasterId r:id="rId25"/>
   </p:notesMasterIdLst>
   <p:sldIdLst>
     <p:sldId id="281" r:id="rId3"/>
@@ -28,10 +28,14 @@
     <p:sldId id="296" r:id="rId20"/>
     <p:sldId id="324" r:id="rId21"/>
     <p:sldId id="326" r:id="rId22"/>
-    <p:sldId id="297" r:id="rId23"/>
+    <p:sldId id="328" r:id="rId23"/>
+    <p:sldId id="297" r:id="rId24"/>
   </p:sldIdLst>
   <p:sldSz cx="12192000" cy="6858000"/>
   <p:notesSz cx="6858000" cy="9144000"/>
+  <p:custDataLst>
+    <p:tags r:id="rId29"/>
+  </p:custDataLst>
   <p:defaultTextStyle>
     <a:defPPr>
       <a:defRPr lang="zh-CN"/>
@@ -127,6 +131,22 @@
       </a:defRPr>
     </a:lvl9pPr>
   </p:defaultTextStyle>
+  <p:extLst>
+    <p:ext uri="{EFAFB233-063F-42B5-8137-9DF3F51BA10A}">
+      <p15:sldGuideLst xmlns:p15="http://schemas.microsoft.com/office/powerpoint/2012/main">
+        <p15:guide id="1" orient="horz" pos="2160" userDrawn="1">
+          <p15:clr>
+            <a:srgbClr val="A4A3A4"/>
+          </p15:clr>
+        </p15:guide>
+        <p15:guide id="2" pos="3818" userDrawn="1">
+          <p15:clr>
+            <a:srgbClr val="A4A3A4"/>
+          </p15:clr>
+        </p15:guide>
+      </p15:sldGuideLst>
+    </p:ext>
+  </p:extLst>
 </p:presentation>
 </file>
 
@@ -3244,7 +3264,7 @@
         <a:spcBef>
           <a:spcPts val="1000"/>
         </a:spcBef>
-        <a:buFont typeface="Arial" panose="020B0604020202020204" pitchFamily="34" charset="0"/>
+        <a:buFont typeface="Arial" panose="020B0704020202020204" pitchFamily="34" charset="0"/>
         <a:buChar char="•"/>
         <a:defRPr sz="2800" kern="1200">
           <a:solidFill>
@@ -3262,7 +3282,7 @@
         <a:spcBef>
           <a:spcPts val="500"/>
         </a:spcBef>
-        <a:buFont typeface="Arial" panose="020B0604020202020204" pitchFamily="34" charset="0"/>
+        <a:buFont typeface="Arial" panose="020B0704020202020204" pitchFamily="34" charset="0"/>
         <a:buChar char="•"/>
         <a:defRPr sz="2400" kern="1200">
           <a:solidFill>
@@ -3280,7 +3300,7 @@
         <a:spcBef>
           <a:spcPts val="500"/>
         </a:spcBef>
-        <a:buFont typeface="Arial" panose="020B0604020202020204" pitchFamily="34" charset="0"/>
+        <a:buFont typeface="Arial" panose="020B0704020202020204" pitchFamily="34" charset="0"/>
         <a:buChar char="•"/>
         <a:defRPr sz="2000" kern="1200">
           <a:solidFill>
@@ -3298,7 +3318,7 @@
         <a:spcBef>
           <a:spcPts val="500"/>
         </a:spcBef>
-        <a:buFont typeface="Arial" panose="020B0604020202020204" pitchFamily="34" charset="0"/>
+        <a:buFont typeface="Arial" panose="020B0704020202020204" pitchFamily="34" charset="0"/>
         <a:buChar char="•"/>
         <a:defRPr sz="1800" kern="1200">
           <a:solidFill>
@@ -3316,7 +3336,7 @@
         <a:spcBef>
           <a:spcPts val="500"/>
         </a:spcBef>
-        <a:buFont typeface="Arial" panose="020B0604020202020204" pitchFamily="34" charset="0"/>
+        <a:buFont typeface="Arial" panose="020B0704020202020204" pitchFamily="34" charset="0"/>
         <a:buChar char="•"/>
         <a:defRPr sz="1800" kern="1200">
           <a:solidFill>
@@ -3334,7 +3354,7 @@
         <a:spcBef>
           <a:spcPts val="500"/>
         </a:spcBef>
-        <a:buFont typeface="Arial" panose="020B0604020202020204" pitchFamily="34" charset="0"/>
+        <a:buFont typeface="Arial" panose="020B0704020202020204" pitchFamily="34" charset="0"/>
         <a:buChar char="•"/>
         <a:defRPr sz="1800" kern="1200">
           <a:solidFill>
@@ -3352,7 +3372,7 @@
         <a:spcBef>
           <a:spcPts val="500"/>
         </a:spcBef>
-        <a:buFont typeface="Arial" panose="020B0604020202020204" pitchFamily="34" charset="0"/>
+        <a:buFont typeface="Arial" panose="020B0704020202020204" pitchFamily="34" charset="0"/>
         <a:buChar char="•"/>
         <a:defRPr sz="1800" kern="1200">
           <a:solidFill>
@@ -3370,7 +3390,7 @@
         <a:spcBef>
           <a:spcPts val="500"/>
         </a:spcBef>
-        <a:buFont typeface="Arial" panose="020B0604020202020204" pitchFamily="34" charset="0"/>
+        <a:buFont typeface="Arial" panose="020B0704020202020204" pitchFamily="34" charset="0"/>
         <a:buChar char="•"/>
         <a:defRPr sz="1800" kern="1200">
           <a:solidFill>
@@ -3388,7 +3408,7 @@
         <a:spcBef>
           <a:spcPts val="500"/>
         </a:spcBef>
-        <a:buFont typeface="Arial" panose="020B0604020202020204" pitchFamily="34" charset="0"/>
+        <a:buFont typeface="Arial" panose="020B0704020202020204" pitchFamily="34" charset="0"/>
         <a:buChar char="•"/>
         <a:defRPr sz="1800" kern="1200">
           <a:solidFill>
@@ -3579,7 +3599,11 @@
             <a:bodyPr rtlCol="0" anchor="ctr"/>
             <a:p>
               <a:pPr algn="ctr"/>
-              <a:endParaRPr lang="zh-CN" altLang="en-US"/>
+              <a:r>
+                <a:rPr lang="en-US" altLang="zh-CN"/>
+                <a:t>h</a:t>
+              </a:r>
+              <a:endParaRPr lang="en-US" altLang="zh-CN"/>
             </a:p>
           </p:txBody>
         </p:sp>
@@ -3829,8 +3853,8 @@
                   <a:solidFill>
                     <a:schemeClr val="bg1"/>
                   </a:solidFill>
-                  <a:latin typeface="Comic Sans MS Bold" panose="030F0702030302020204" charset="0"/>
-                  <a:cs typeface="Comic Sans MS Bold" panose="030F0702030302020204" charset="0"/>
+                  <a:latin typeface="Comic Sans MS Bold" panose="030F0902030302020204" charset="0"/>
+                  <a:cs typeface="Comic Sans MS Bold" panose="030F0902030302020204" charset="0"/>
                 </a:rPr>
                 <a:t>Node.js </a:t>
               </a:r>
@@ -3839,8 +3863,8 @@
                   <a:solidFill>
                     <a:schemeClr val="bg1"/>
                   </a:solidFill>
-                  <a:latin typeface="Comic Sans MS Bold" panose="030F0702030302020204" charset="0"/>
-                  <a:cs typeface="Comic Sans MS Bold" panose="030F0702030302020204" charset="0"/>
+                  <a:latin typeface="Comic Sans MS Bold" panose="030F0902030302020204" charset="0"/>
+                  <a:cs typeface="Comic Sans MS Bold" panose="030F0902030302020204" charset="0"/>
                 </a:rPr>
                 <a:t>Advanced</a:t>
               </a:r>
@@ -3848,8 +3872,8 @@
                 <a:solidFill>
                   <a:schemeClr val="bg1"/>
                 </a:solidFill>
-                <a:latin typeface="Comic Sans MS Bold" panose="030F0702030302020204" charset="0"/>
-                <a:cs typeface="Comic Sans MS Bold" panose="030F0702030302020204" charset="0"/>
+                <a:latin typeface="Comic Sans MS Bold" panose="030F0902030302020204" charset="0"/>
+                <a:cs typeface="Comic Sans MS Bold" panose="030F0902030302020204" charset="0"/>
               </a:endParaRPr>
             </a:p>
           </p:txBody>
@@ -3880,8 +3904,8 @@
                   <a:solidFill>
                     <a:srgbClr val="FEB692"/>
                   </a:solidFill>
-                  <a:latin typeface="Comic Sans MS Bold" panose="030F0702030302020204" charset="0"/>
-                  <a:cs typeface="Comic Sans MS Bold" panose="030F0702030302020204" charset="0"/>
+                  <a:latin typeface="Comic Sans MS Bold" panose="030F0902030302020204" charset="0"/>
+                  <a:cs typeface="Comic Sans MS Bold" panose="030F0902030302020204" charset="0"/>
                 </a:rPr>
                 <a:t>http.Agent</a:t>
               </a:r>
@@ -3889,8 +3913,8 @@
                 <a:solidFill>
                   <a:srgbClr val="FEB692"/>
                 </a:solidFill>
-                <a:latin typeface="Comic Sans MS Bold" panose="030F0702030302020204" charset="0"/>
-                <a:cs typeface="Comic Sans MS Bold" panose="030F0702030302020204" charset="0"/>
+                <a:latin typeface="Comic Sans MS Bold" panose="030F0902030302020204" charset="0"/>
+                <a:cs typeface="Comic Sans MS Bold" panose="030F0902030302020204" charset="0"/>
               </a:endParaRPr>
             </a:p>
           </p:txBody>
@@ -4019,8 +4043,8 @@
                   <a:solidFill>
                     <a:schemeClr val="bg1"/>
                   </a:solidFill>
-                  <a:latin typeface="Comic Sans MS Bold" panose="030F0702030302020204" charset="0"/>
-                  <a:cs typeface="Comic Sans MS Bold" panose="030F0702030302020204" charset="0"/>
+                  <a:latin typeface="Comic Sans MS Bold" panose="030F0902030302020204" charset="0"/>
+                  <a:cs typeface="Comic Sans MS Bold" panose="030F0902030302020204" charset="0"/>
                 </a:rPr>
                 <a:t>Node.js Advance</a:t>
               </a:r>
@@ -4029,8 +4053,8 @@
                   <a:solidFill>
                     <a:schemeClr val="bg1"/>
                   </a:solidFill>
-                  <a:latin typeface="Comic Sans MS Bold" panose="030F0702030302020204" charset="0"/>
-                  <a:cs typeface="Comic Sans MS Bold" panose="030F0702030302020204" charset="0"/>
+                  <a:latin typeface="Comic Sans MS Bold" panose="030F0902030302020204" charset="0"/>
+                  <a:cs typeface="Comic Sans MS Bold" panose="030F0902030302020204" charset="0"/>
                 </a:rPr>
                 <a:t>d</a:t>
               </a:r>
@@ -4038,8 +4062,8 @@
                 <a:solidFill>
                   <a:schemeClr val="bg1"/>
                 </a:solidFill>
-                <a:latin typeface="Comic Sans MS Bold" panose="030F0702030302020204" charset="0"/>
-                <a:cs typeface="Comic Sans MS Bold" panose="030F0702030302020204" charset="0"/>
+                <a:latin typeface="Comic Sans MS Bold" panose="030F0902030302020204" charset="0"/>
+                <a:cs typeface="Comic Sans MS Bold" panose="030F0902030302020204" charset="0"/>
               </a:endParaRPr>
             </a:p>
           </p:txBody>
@@ -4070,8 +4094,8 @@
                   <a:solidFill>
                     <a:srgbClr val="000080"/>
                   </a:solidFill>
-                  <a:latin typeface="Comic Sans MS Bold" panose="030F0702030302020204" charset="0"/>
-                  <a:cs typeface="Comic Sans MS Bold" panose="030F0702030302020204" charset="0"/>
+                  <a:latin typeface="Comic Sans MS Bold" panose="030F0902030302020204" charset="0"/>
+                  <a:cs typeface="Comic Sans MS Bold" panose="030F0902030302020204" charset="0"/>
                 </a:rPr>
                 <a:t>RPC</a:t>
               </a:r>
@@ -4079,8 +4103,8 @@
                 <a:solidFill>
                   <a:srgbClr val="000080"/>
                 </a:solidFill>
-                <a:latin typeface="Comic Sans MS Bold" panose="030F0702030302020204" charset="0"/>
-                <a:cs typeface="Comic Sans MS Bold" panose="030F0702030302020204" charset="0"/>
+                <a:latin typeface="Comic Sans MS Bold" panose="030F0902030302020204" charset="0"/>
+                <a:cs typeface="Comic Sans MS Bold" panose="030F0902030302020204" charset="0"/>
               </a:endParaRPr>
             </a:p>
           </p:txBody>
@@ -4210,8 +4234,8 @@
                   <a:solidFill>
                     <a:schemeClr val="bg1"/>
                   </a:solidFill>
-                  <a:latin typeface="Comic Sans MS Bold" panose="030F0702030302020204" charset="0"/>
-                  <a:cs typeface="Comic Sans MS Bold" panose="030F0702030302020204" charset="0"/>
+                  <a:latin typeface="Comic Sans MS Bold" panose="030F0902030302020204" charset="0"/>
+                  <a:cs typeface="Comic Sans MS Bold" panose="030F0902030302020204" charset="0"/>
                 </a:rPr>
                 <a:t>Dependency Injection</a:t>
               </a:r>
@@ -4219,8 +4243,8 @@
                 <a:solidFill>
                   <a:schemeClr val="bg1"/>
                 </a:solidFill>
-                <a:latin typeface="Comic Sans MS Bold" panose="030F0702030302020204" charset="0"/>
-                <a:cs typeface="Comic Sans MS Bold" panose="030F0702030302020204" charset="0"/>
+                <a:latin typeface="Comic Sans MS Bold" panose="030F0902030302020204" charset="0"/>
+                <a:cs typeface="Comic Sans MS Bold" panose="030F0902030302020204" charset="0"/>
               </a:endParaRPr>
             </a:p>
           </p:txBody>
@@ -4251,8 +4275,8 @@
                   <a:solidFill>
                     <a:srgbClr val="00B050"/>
                   </a:solidFill>
-                  <a:latin typeface="Comic Sans MS Bold" panose="030F0702030302020204" charset="0"/>
-                  <a:cs typeface="Comic Sans MS Bold" panose="030F0702030302020204" charset="0"/>
+                  <a:latin typeface="Comic Sans MS Bold" panose="030F0902030302020204" charset="0"/>
+                  <a:cs typeface="Comic Sans MS Bold" panose="030F0902030302020204" charset="0"/>
                 </a:rPr>
                 <a:t>Nest.js</a:t>
               </a:r>
@@ -4260,8 +4284,8 @@
                 <a:solidFill>
                   <a:srgbClr val="00B050"/>
                 </a:solidFill>
-                <a:latin typeface="Comic Sans MS Bold" panose="030F0702030302020204" charset="0"/>
-                <a:cs typeface="Comic Sans MS Bold" panose="030F0702030302020204" charset="0"/>
+                <a:latin typeface="Comic Sans MS Bold" panose="030F0902030302020204" charset="0"/>
+                <a:cs typeface="Comic Sans MS Bold" panose="030F0902030302020204" charset="0"/>
               </a:endParaRPr>
             </a:p>
           </p:txBody>
@@ -4411,8 +4435,8 @@
                   <a:solidFill>
                     <a:schemeClr val="bg1"/>
                   </a:solidFill>
-                  <a:latin typeface="Comic Sans MS Bold" panose="030F0702030302020204" charset="0"/>
-                  <a:cs typeface="Comic Sans MS Bold" panose="030F0702030302020204" charset="0"/>
+                  <a:latin typeface="Comic Sans MS Bold" panose="030F0902030302020204" charset="0"/>
+                  <a:cs typeface="Comic Sans MS Bold" panose="030F0902030302020204" charset="0"/>
                 </a:rPr>
                 <a:t>Transfer-Encoding: chunked</a:t>
               </a:r>
@@ -4420,8 +4444,8 @@
                 <a:solidFill>
                   <a:schemeClr val="bg1"/>
                 </a:solidFill>
-                <a:latin typeface="Comic Sans MS Bold" panose="030F0702030302020204" charset="0"/>
-                <a:cs typeface="Comic Sans MS Bold" panose="030F0702030302020204" charset="0"/>
+                <a:latin typeface="Comic Sans MS Bold" panose="030F0902030302020204" charset="0"/>
+                <a:cs typeface="Comic Sans MS Bold" panose="030F0902030302020204" charset="0"/>
               </a:endParaRPr>
             </a:p>
           </p:txBody>
@@ -4459,8 +4483,8 @@
                   <a:solidFill>
                     <a:srgbClr val="45BAF2"/>
                   </a:solidFill>
-                  <a:latin typeface="Comic Sans MS Bold" panose="030F0702030302020204" charset="0"/>
-                  <a:cs typeface="Comic Sans MS Bold" panose="030F0702030302020204" charset="0"/>
+                  <a:latin typeface="Comic Sans MS Bold" panose="030F0902030302020204" charset="0"/>
+                  <a:cs typeface="Comic Sans MS Bold" panose="030F0902030302020204" charset="0"/>
                 </a:rPr>
                 <a:t>HTTP2</a:t>
               </a:r>
@@ -4468,8 +4492,8 @@
                 <a:solidFill>
                   <a:srgbClr val="45BAF2"/>
                 </a:solidFill>
-                <a:latin typeface="Comic Sans MS Bold" panose="030F0702030302020204" charset="0"/>
-                <a:cs typeface="Comic Sans MS Bold" panose="030F0702030302020204" charset="0"/>
+                <a:latin typeface="Comic Sans MS Bold" panose="030F0902030302020204" charset="0"/>
+                <a:cs typeface="Comic Sans MS Bold" panose="030F0902030302020204" charset="0"/>
               </a:endParaRPr>
             </a:p>
           </p:txBody>
@@ -4621,7 +4645,7 @@
                   </a:solidFill>
                   <a:latin typeface="PingFang SC Regular" panose="020B0400000000000000" charset="-122"/>
                   <a:ea typeface="PingFang SC Regular" panose="020B0400000000000000" charset="-122"/>
-                  <a:cs typeface="Comic Sans MS Bold" panose="030F0702030302020204" charset="0"/>
+                  <a:cs typeface="Comic Sans MS Bold" panose="030F0902030302020204" charset="0"/>
                 </a:rPr>
                 <a:t>模拟</a:t>
               </a:r>
@@ -4630,8 +4654,8 @@
                   <a:solidFill>
                     <a:schemeClr val="bg1"/>
                   </a:solidFill>
-                  <a:latin typeface="Comic Sans MS Bold" panose="030F0702030302020204" charset="0"/>
-                  <a:cs typeface="Comic Sans MS Bold" panose="030F0702030302020204" charset="0"/>
+                  <a:latin typeface="Comic Sans MS Bold" panose="030F0902030302020204" charset="0"/>
+                  <a:cs typeface="Comic Sans MS Bold" panose="030F0902030302020204" charset="0"/>
                 </a:rPr>
                 <a:t>ChatGPT</a:t>
               </a:r>
@@ -4642,7 +4666,7 @@
                   </a:solidFill>
                   <a:latin typeface="PingFang SC Regular" panose="020B0400000000000000" charset="-122"/>
                   <a:ea typeface="PingFang SC Regular" panose="020B0400000000000000" charset="-122"/>
-                  <a:cs typeface="Comic Sans MS Bold" panose="030F0702030302020204" charset="0"/>
+                  <a:cs typeface="Comic Sans MS Bold" panose="030F0902030302020204" charset="0"/>
                 </a:rPr>
                 <a:t>答案生成动画</a:t>
               </a:r>
@@ -4652,7 +4676,7 @@
                 </a:solidFill>
                 <a:latin typeface="PingFang SC Regular" panose="020B0400000000000000" charset="-122"/>
                 <a:ea typeface="PingFang SC Regular" panose="020B0400000000000000" charset="-122"/>
-                <a:cs typeface="Comic Sans MS Bold" panose="030F0702030302020204" charset="0"/>
+                <a:cs typeface="Comic Sans MS Bold" panose="030F0902030302020204" charset="0"/>
               </a:endParaRPr>
             </a:p>
           </p:txBody>
@@ -4803,8 +4827,8 @@
                   <a:solidFill>
                     <a:srgbClr val="45BAF2"/>
                   </a:solidFill>
-                  <a:latin typeface="Comic Sans MS Bold" panose="030F0702030302020204" charset="0"/>
-                  <a:cs typeface="Comic Sans MS Bold" panose="030F0702030302020204" charset="0"/>
+                  <a:latin typeface="Comic Sans MS Bold" panose="030F0902030302020204" charset="0"/>
+                  <a:cs typeface="Comic Sans MS Bold" panose="030F0902030302020204" charset="0"/>
                 </a:rPr>
                 <a:t>+ SSR</a:t>
               </a:r>
@@ -4812,8 +4836,8 @@
                 <a:solidFill>
                   <a:srgbClr val="45BAF2"/>
                 </a:solidFill>
-                <a:latin typeface="Comic Sans MS Bold" panose="030F0702030302020204" charset="0"/>
-                <a:cs typeface="Comic Sans MS Bold" panose="030F0702030302020204" charset="0"/>
+                <a:latin typeface="Comic Sans MS Bold" panose="030F0902030302020204" charset="0"/>
+                <a:cs typeface="Comic Sans MS Bold" panose="030F0902030302020204" charset="0"/>
               </a:endParaRPr>
             </a:p>
           </p:txBody>
@@ -4958,8 +4982,8 @@
                   <a:solidFill>
                     <a:schemeClr val="bg1"/>
                   </a:solidFill>
-                  <a:latin typeface="Comic Sans MS Bold" panose="030F0702030302020204" charset="0"/>
-                  <a:cs typeface="Comic Sans MS Bold" panose="030F0702030302020204" charset="0"/>
+                  <a:latin typeface="Comic Sans MS Bold" panose="030F0902030302020204" charset="0"/>
+                  <a:cs typeface="Comic Sans MS Bold" panose="030F0902030302020204" charset="0"/>
                 </a:rPr>
                 <a:t>Node.js Advance</a:t>
               </a:r>
@@ -4968,8 +4992,8 @@
                   <a:solidFill>
                     <a:schemeClr val="bg1"/>
                   </a:solidFill>
-                  <a:latin typeface="Comic Sans MS Bold" panose="030F0702030302020204" charset="0"/>
-                  <a:cs typeface="Comic Sans MS Bold" panose="030F0702030302020204" charset="0"/>
+                  <a:latin typeface="Comic Sans MS Bold" panose="030F0902030302020204" charset="0"/>
+                  <a:cs typeface="Comic Sans MS Bold" panose="030F0902030302020204" charset="0"/>
                 </a:rPr>
                 <a:t>d</a:t>
               </a:r>
@@ -4977,8 +5001,8 @@
                 <a:solidFill>
                   <a:schemeClr val="bg1"/>
                 </a:solidFill>
-                <a:latin typeface="Comic Sans MS Bold" panose="030F0702030302020204" charset="0"/>
-                <a:cs typeface="Comic Sans MS Bold" panose="030F0702030302020204" charset="0"/>
+                <a:latin typeface="Comic Sans MS Bold" panose="030F0902030302020204" charset="0"/>
+                <a:cs typeface="Comic Sans MS Bold" panose="030F0902030302020204" charset="0"/>
               </a:endParaRPr>
             </a:p>
           </p:txBody>
@@ -5009,8 +5033,8 @@
                   <a:solidFill>
                     <a:srgbClr val="4F383E"/>
                   </a:solidFill>
-                  <a:latin typeface="Comic Sans MS Bold" panose="030F0702030302020204" charset="0"/>
-                  <a:cs typeface="Comic Sans MS Bold" panose="030F0702030302020204" charset="0"/>
+                  <a:latin typeface="Comic Sans MS Bold" panose="030F0902030302020204" charset="0"/>
+                  <a:cs typeface="Comic Sans MS Bold" panose="030F0902030302020204" charset="0"/>
                 </a:rPr>
                 <a:t>UDP</a:t>
               </a:r>
@@ -5018,8 +5042,8 @@
                 <a:solidFill>
                   <a:srgbClr val="4F383E"/>
                 </a:solidFill>
-                <a:latin typeface="Comic Sans MS Bold" panose="030F0702030302020204" charset="0"/>
-                <a:cs typeface="Comic Sans MS Bold" panose="030F0702030302020204" charset="0"/>
+                <a:latin typeface="Comic Sans MS Bold" panose="030F0902030302020204" charset="0"/>
+                <a:cs typeface="Comic Sans MS Bold" panose="030F0902030302020204" charset="0"/>
               </a:endParaRPr>
             </a:p>
           </p:txBody>
@@ -5289,8 +5313,8 @@
                   <a:solidFill>
                     <a:schemeClr val="bg1"/>
                   </a:solidFill>
-                  <a:latin typeface="Comic Sans MS Bold" panose="030F0702030302020204" charset="0"/>
-                  <a:cs typeface="Comic Sans MS Bold" panose="030F0702030302020204" charset="0"/>
+                  <a:latin typeface="Comic Sans MS Bold" panose="030F0902030302020204" charset="0"/>
+                  <a:cs typeface="Comic Sans MS Bold" panose="030F0902030302020204" charset="0"/>
                 </a:rPr>
                 <a:t>React</a:t>
               </a:r>
@@ -5298,8 +5322,8 @@
                 <a:solidFill>
                   <a:schemeClr val="bg1"/>
                 </a:solidFill>
-                <a:latin typeface="Comic Sans MS Bold" panose="030F0702030302020204" charset="0"/>
-                <a:cs typeface="Comic Sans MS Bold" panose="030F0702030302020204" charset="0"/>
+                <a:latin typeface="Comic Sans MS Bold" panose="030F0902030302020204" charset="0"/>
+                <a:cs typeface="Comic Sans MS Bold" panose="030F0902030302020204" charset="0"/>
               </a:endParaRPr>
             </a:p>
           </p:txBody>
@@ -5330,8 +5354,8 @@
                   <a:solidFill>
                     <a:srgbClr val="4F383E"/>
                   </a:solidFill>
-                  <a:latin typeface="Comic Sans MS Bold" panose="030F0702030302020204" charset="0"/>
-                  <a:cs typeface="Comic Sans MS Bold" panose="030F0702030302020204" charset="0"/>
+                  <a:latin typeface="Comic Sans MS Bold" panose="030F0902030302020204" charset="0"/>
+                  <a:cs typeface="Comic Sans MS Bold" panose="030F0902030302020204" charset="0"/>
                 </a:rPr>
                 <a:t>Server Component</a:t>
               </a:r>
@@ -5339,8 +5363,8 @@
                 <a:solidFill>
                   <a:srgbClr val="4F383E"/>
                 </a:solidFill>
-                <a:latin typeface="Comic Sans MS Bold" panose="030F0702030302020204" charset="0"/>
-                <a:cs typeface="Comic Sans MS Bold" panose="030F0702030302020204" charset="0"/>
+                <a:latin typeface="Comic Sans MS Bold" panose="030F0902030302020204" charset="0"/>
+                <a:cs typeface="Comic Sans MS Bold" panose="030F0902030302020204" charset="0"/>
               </a:endParaRPr>
             </a:p>
           </p:txBody>
@@ -5507,8 +5531,8 @@
                 <a:solidFill>
                   <a:srgbClr val="4F383E"/>
                 </a:solidFill>
-                <a:latin typeface="Comic Sans MS Bold" panose="030F0702030302020204" charset="0"/>
-                <a:cs typeface="Comic Sans MS Bold" panose="030F0702030302020204" charset="0"/>
+                <a:latin typeface="Comic Sans MS Bold" panose="030F0902030302020204" charset="0"/>
+                <a:cs typeface="Comic Sans MS Bold" panose="030F0902030302020204" charset="0"/>
               </a:rPr>
               <a:t>React </a:t>
             </a:r>
@@ -5517,8 +5541,8 @@
                 <a:solidFill>
                   <a:srgbClr val="4F383E"/>
                 </a:solidFill>
-                <a:latin typeface="Comic Sans MS Bold" panose="030F0702030302020204" charset="0"/>
-                <a:cs typeface="Comic Sans MS Bold" panose="030F0702030302020204" charset="0"/>
+                <a:latin typeface="Comic Sans MS Bold" panose="030F0902030302020204" charset="0"/>
+                <a:cs typeface="Comic Sans MS Bold" panose="030F0902030302020204" charset="0"/>
               </a:rPr>
               <a:t>WASM</a:t>
             </a:r>
@@ -5526,8 +5550,8 @@
               <a:solidFill>
                 <a:srgbClr val="4F383E"/>
               </a:solidFill>
-              <a:latin typeface="Comic Sans MS Bold" panose="030F0702030302020204" charset="0"/>
-              <a:cs typeface="Comic Sans MS Bold" panose="030F0702030302020204" charset="0"/>
+              <a:latin typeface="Comic Sans MS Bold" panose="030F0902030302020204" charset="0"/>
+              <a:cs typeface="Comic Sans MS Bold" panose="030F0902030302020204" charset="0"/>
             </a:endParaRPr>
           </a:p>
         </p:txBody>
@@ -5864,6 +5888,184 @@
         <p:nvPr/>
       </p:nvGrpSpPr>
       <p:grpSpPr/>
+      <p:sp>
+        <p:nvSpPr>
+          <p:cNvPr id="3" name="矩形 2"/>
+          <p:cNvSpPr/>
+          <p:nvPr/>
+        </p:nvSpPr>
+        <p:spPr>
+          <a:xfrm>
+            <a:off x="2765425" y="1481455"/>
+            <a:ext cx="5781040" cy="2459990"/>
+          </a:xfrm>
+          <a:prstGeom prst="rect">
+            <a:avLst/>
+          </a:prstGeom>
+          <a:gradFill>
+            <a:gsLst>
+              <a:gs pos="0">
+                <a:srgbClr val="F7FF00"/>
+              </a:gs>
+              <a:gs pos="100000">
+                <a:srgbClr val="DC37A4"/>
+              </a:gs>
+            </a:gsLst>
+            <a:lin ang="0" scaled="0"/>
+          </a:gradFill>
+          <a:ln>
+            <a:noFill/>
+          </a:ln>
+        </p:spPr>
+        <p:style>
+          <a:lnRef idx="2">
+            <a:schemeClr val="accent1">
+              <a:shade val="50000"/>
+            </a:schemeClr>
+          </a:lnRef>
+          <a:fillRef idx="1">
+            <a:schemeClr val="accent1"/>
+          </a:fillRef>
+          <a:effectRef idx="0">
+            <a:schemeClr val="accent1"/>
+          </a:effectRef>
+          <a:fontRef idx="minor">
+            <a:schemeClr val="lt1"/>
+          </a:fontRef>
+        </p:style>
+        <p:txBody>
+          <a:bodyPr rtlCol="0" anchor="ctr"/>
+          <a:p>
+            <a:pPr algn="ctr"/>
+            <a:endParaRPr lang="zh-CN" altLang="en-US"/>
+          </a:p>
+        </p:txBody>
+      </p:sp>
+      <p:pic>
+        <p:nvPicPr>
+          <p:cNvPr id="5" name="图片 4" descr="/Users/youxingzhi/Downloads/icon-square-big.pngicon-square-big"/>
+          <p:cNvPicPr>
+            <a:picLocks noChangeAspect="1"/>
+          </p:cNvPicPr>
+          <p:nvPr/>
+        </p:nvPicPr>
+        <p:blipFill>
+          <a:blip r:embed="rId1">
+            <a:alphaModFix amt="60000"/>
+          </a:blip>
+          <a:srcRect/>
+          <a:stretch>
+            <a:fillRect/>
+          </a:stretch>
+        </p:blipFill>
+        <p:spPr>
+          <a:xfrm>
+            <a:off x="3776345" y="1873250"/>
+            <a:ext cx="1682115" cy="1682115"/>
+          </a:xfrm>
+          <a:prstGeom prst="rect">
+            <a:avLst/>
+          </a:prstGeom>
+        </p:spPr>
+      </p:pic>
+      <p:pic>
+        <p:nvPicPr>
+          <p:cNvPr id="7" name="图片 6" descr="/Users/youxingzhi/Downloads/Rust_programming_language_black_logo.svg.pngRust_programming_language_black_logo.svg"/>
+          <p:cNvPicPr>
+            <a:picLocks noChangeAspect="1"/>
+          </p:cNvPicPr>
+          <p:nvPr/>
+        </p:nvPicPr>
+        <p:blipFill>
+          <a:blip r:embed="rId2">
+            <a:alphaModFix amt="60000"/>
+          </a:blip>
+          <a:srcRect/>
+          <a:stretch>
+            <a:fillRect/>
+          </a:stretch>
+        </p:blipFill>
+        <p:spPr>
+          <a:xfrm>
+            <a:off x="6202680" y="2066290"/>
+            <a:ext cx="1290320" cy="1290320"/>
+          </a:xfrm>
+          <a:prstGeom prst="rect">
+            <a:avLst/>
+          </a:prstGeom>
+        </p:spPr>
+      </p:pic>
+      <p:sp>
+        <p:nvSpPr>
+          <p:cNvPr id="6" name="文本框 5"/>
+          <p:cNvSpPr txBox="1"/>
+          <p:nvPr/>
+        </p:nvSpPr>
+        <p:spPr>
+          <a:xfrm>
+            <a:off x="3397250" y="2330450"/>
+            <a:ext cx="4032250" cy="768350"/>
+          </a:xfrm>
+          <a:prstGeom prst="rect">
+            <a:avLst/>
+          </a:prstGeom>
+          <a:noFill/>
+        </p:spPr>
+        <p:txBody>
+          <a:bodyPr wrap="none" rtlCol="0">
+            <a:spAutoFit/>
+          </a:bodyPr>
+          <a:p>
+            <a:r>
+              <a:rPr lang="en-US" altLang="zh-CN" sz="4400" b="1">
+                <a:solidFill>
+                  <a:srgbClr val="00B0F0"/>
+                </a:solidFill>
+                <a:latin typeface="Comic Sans MS Bold" panose="030F0902030302020204" charset="0"/>
+                <a:cs typeface="Comic Sans MS Bold" panose="030F0902030302020204" charset="0"/>
+              </a:rPr>
+              <a:t>Webpack Rust</a:t>
+            </a:r>
+            <a:endParaRPr lang="en-US" altLang="zh-CN" sz="4400" b="1">
+              <a:solidFill>
+                <a:srgbClr val="00B0F0"/>
+              </a:solidFill>
+              <a:latin typeface="Comic Sans MS Bold" panose="030F0902030302020204" charset="0"/>
+              <a:cs typeface="Comic Sans MS Bold" panose="030F0902030302020204" charset="0"/>
+            </a:endParaRPr>
+          </a:p>
+        </p:txBody>
+      </p:sp>
+    </p:spTree>
+  </p:cSld>
+  <p:clrMapOvr>
+    <a:masterClrMapping/>
+  </p:clrMapOvr>
+  <mc:AlternateContent xmlns:mc="http://schemas.openxmlformats.org/markup-compatibility/2006">
+    <mc:Choice xmlns:p14="http://schemas.microsoft.com/office/powerpoint/2010/main" Requires="p14">
+      <p:transition spd="slow" p14:dur="1500" advClick="0" advTm="0">
+        <p:random/>
+      </p:transition>
+    </mc:Choice>
+    <mc:Fallback>
+      <p:transition spd="slow" advClick="0" advTm="0">
+        <p:random/>
+      </p:transition>
+    </mc:Fallback>
+  </mc:AlternateContent>
+</p:sld>
+</file>
+
+<file path=ppt/slides/slide22.xml><?xml version="1.0" encoding="utf-8"?>
+<p:sld xmlns:a="http://schemas.openxmlformats.org/drawingml/2006/main" xmlns:r="http://schemas.openxmlformats.org/officeDocument/2006/relationships" xmlns:p="http://schemas.openxmlformats.org/presentationml/2006/main">
+  <p:cSld>
+    <p:spTree>
+      <p:nvGrpSpPr>
+        <p:cNvPr id="1" name=""/>
+        <p:cNvGrpSpPr/>
+        <p:nvPr/>
+      </p:nvGrpSpPr>
+      <p:grpSpPr/>
       <p:grpSp>
         <p:nvGrpSpPr>
           <p:cNvPr id="4" name="组合 3"/>
@@ -5959,8 +6161,8 @@
                   <a:solidFill>
                     <a:schemeClr val="bg1"/>
                   </a:solidFill>
-                  <a:latin typeface="Comic Sans MS Bold" panose="030F0702030302020204" charset="0"/>
-                  <a:cs typeface="Comic Sans MS Bold" panose="030F0702030302020204" charset="0"/>
+                  <a:latin typeface="Comic Sans MS Bold" panose="030F0902030302020204" charset="0"/>
+                  <a:cs typeface="Comic Sans MS Bold" panose="030F0902030302020204" charset="0"/>
                 </a:rPr>
                 <a:t>Node.js</a:t>
               </a:r>
@@ -5968,8 +6170,8 @@
                 <a:solidFill>
                   <a:schemeClr val="bg1"/>
                 </a:solidFill>
-                <a:latin typeface="Comic Sans MS Bold" panose="030F0702030302020204" charset="0"/>
-                <a:cs typeface="Comic Sans MS Bold" panose="030F0702030302020204" charset="0"/>
+                <a:latin typeface="Comic Sans MS Bold" panose="030F0902030302020204" charset="0"/>
+                <a:cs typeface="Comic Sans MS Bold" panose="030F0902030302020204" charset="0"/>
               </a:endParaRPr>
             </a:p>
           </p:txBody>
@@ -6001,8 +6203,8 @@
                   <a:solidFill>
                     <a:srgbClr val="4F383E"/>
                   </a:solidFill>
-                  <a:latin typeface="Comic Sans MS Bold" panose="030F0702030302020204" charset="0"/>
-                  <a:cs typeface="Comic Sans MS Bold" panose="030F0702030302020204" charset="0"/>
+                  <a:latin typeface="Comic Sans MS Bold" panose="030F0902030302020204" charset="0"/>
+                  <a:cs typeface="Comic Sans MS Bold" panose="030F0902030302020204" charset="0"/>
                 </a:rPr>
                 <a:t>OOM</a:t>
               </a:r>
@@ -6010,8 +6212,8 @@
                 <a:solidFill>
                   <a:srgbClr val="4F383E"/>
                 </a:solidFill>
-                <a:latin typeface="Comic Sans MS Bold" panose="030F0702030302020204" charset="0"/>
-                <a:cs typeface="Comic Sans MS Bold" panose="030F0702030302020204" charset="0"/>
+                <a:latin typeface="Comic Sans MS Bold" panose="030F0902030302020204" charset="0"/>
+                <a:cs typeface="Comic Sans MS Bold" panose="030F0902030302020204" charset="0"/>
               </a:endParaRPr>
             </a:p>
           </p:txBody>
@@ -6462,8 +6664,8 @@
           <a:p>
             <a:r>
               <a:rPr lang="en-US" altLang="zh-CN" sz="3600">
-                <a:latin typeface="Comic Sans MS Regular" panose="030F0702030302020204" charset="0"/>
-                <a:cs typeface="Comic Sans MS Regular" panose="030F0702030302020204" charset="0"/>
+                <a:latin typeface="Comic Sans MS Regular" panose="030F0902030302020204" charset="0"/>
+                <a:cs typeface="Comic Sans MS Regular" panose="030F0902030302020204" charset="0"/>
               </a:rPr>
               <a:t>React </a:t>
             </a:r>
@@ -6480,8 +6682,8 @@
                     </a:schemeClr>
                   </a:glow>
                 </a:effectLst>
-                <a:latin typeface="Comic Sans MS Regular" panose="030F0702030302020204" charset="0"/>
-                <a:cs typeface="Comic Sans MS Regular" panose="030F0702030302020204" charset="0"/>
+                <a:latin typeface="Comic Sans MS Regular" panose="030F0902030302020204" charset="0"/>
+                <a:cs typeface="Comic Sans MS Regular" panose="030F0902030302020204" charset="0"/>
               </a:rPr>
               <a:t>Suspense</a:t>
             </a:r>
@@ -6497,8 +6699,8 @@
                   </a:schemeClr>
                 </a:glow>
               </a:effectLst>
-              <a:latin typeface="Comic Sans MS Regular" panose="030F0702030302020204" charset="0"/>
-              <a:cs typeface="Comic Sans MS Regular" panose="030F0702030302020204" charset="0"/>
+              <a:latin typeface="Comic Sans MS Regular" panose="030F0902030302020204" charset="0"/>
+              <a:cs typeface="Comic Sans MS Regular" panose="030F0902030302020204" charset="0"/>
             </a:endParaRPr>
           </a:p>
         </p:txBody>
@@ -6652,14 +6854,14 @@
           <a:p>
             <a:r>
               <a:rPr lang="en-US" altLang="zh-CN" sz="3600">
-                <a:latin typeface="Comic Sans MS Regular" panose="030F0702030302020204" charset="0"/>
-                <a:cs typeface="Comic Sans MS Regular" panose="030F0702030302020204" charset="0"/>
+                <a:latin typeface="Comic Sans MS Regular" panose="030F0902030302020204" charset="0"/>
+                <a:cs typeface="Comic Sans MS Regular" panose="030F0902030302020204" charset="0"/>
               </a:rPr>
               <a:t>Rate Limit</a:t>
             </a:r>
             <a:endParaRPr lang="en-US" altLang="zh-CN" sz="3600">
-              <a:latin typeface="Comic Sans MS Regular" panose="030F0702030302020204" charset="0"/>
-              <a:cs typeface="Comic Sans MS Regular" panose="030F0702030302020204" charset="0"/>
+              <a:latin typeface="Comic Sans MS Regular" panose="030F0902030302020204" charset="0"/>
+              <a:cs typeface="Comic Sans MS Regular" panose="030F0902030302020204" charset="0"/>
             </a:endParaRPr>
           </a:p>
         </p:txBody>
@@ -6789,8 +6991,8 @@
                 <a:solidFill>
                   <a:schemeClr val="bg1"/>
                 </a:solidFill>
-                <a:latin typeface="Comic Sans MS Regular" panose="030F0702030302020204" charset="0"/>
-                <a:cs typeface="Comic Sans MS Regular" panose="030F0702030302020204" charset="0"/>
+                <a:latin typeface="Comic Sans MS Regular" panose="030F0902030302020204" charset="0"/>
+                <a:cs typeface="Comic Sans MS Regular" panose="030F0902030302020204" charset="0"/>
               </a:rPr>
               <a:t>Streaming Rrender</a:t>
             </a:r>
@@ -6798,8 +7000,8 @@
               <a:solidFill>
                 <a:schemeClr val="bg1"/>
               </a:solidFill>
-              <a:latin typeface="Comic Sans MS Regular" panose="030F0702030302020204" charset="0"/>
-              <a:cs typeface="Comic Sans MS Regular" panose="030F0702030302020204" charset="0"/>
+              <a:latin typeface="Comic Sans MS Regular" panose="030F0902030302020204" charset="0"/>
+              <a:cs typeface="Comic Sans MS Regular" panose="030F0902030302020204" charset="0"/>
             </a:endParaRPr>
           </a:p>
         </p:txBody>
@@ -6830,8 +7032,8 @@
                 <a:solidFill>
                   <a:schemeClr val="bg1"/>
                 </a:solidFill>
-                <a:latin typeface="Comic Sans MS Regular" panose="030F0702030302020204" charset="0"/>
-                <a:cs typeface="Comic Sans MS Regular" panose="030F0702030302020204" charset="0"/>
+                <a:latin typeface="Comic Sans MS Regular" panose="030F0902030302020204" charset="0"/>
+                <a:cs typeface="Comic Sans MS Regular" panose="030F0902030302020204" charset="0"/>
               </a:rPr>
               <a:t>Selection Hydration</a:t>
             </a:r>
@@ -6839,8 +7041,8 @@
               <a:solidFill>
                 <a:schemeClr val="bg1"/>
               </a:solidFill>
-              <a:latin typeface="Comic Sans MS Regular" panose="030F0702030302020204" charset="0"/>
-              <a:cs typeface="Comic Sans MS Regular" panose="030F0702030302020204" charset="0"/>
+              <a:latin typeface="Comic Sans MS Regular" panose="030F0902030302020204" charset="0"/>
+              <a:cs typeface="Comic Sans MS Regular" panose="030F0902030302020204" charset="0"/>
             </a:endParaRPr>
           </a:p>
         </p:txBody>
@@ -6988,8 +7190,8 @@
                 <a:solidFill>
                   <a:schemeClr val="bg1"/>
                 </a:solidFill>
-                <a:latin typeface="Comic Sans MS Bold" panose="030F0702030302020204" charset="0"/>
-                <a:cs typeface="Comic Sans MS Bold" panose="030F0702030302020204" charset="0"/>
+                <a:latin typeface="Comic Sans MS Bold" panose="030F0902030302020204" charset="0"/>
+                <a:cs typeface="Comic Sans MS Bold" panose="030F0902030302020204" charset="0"/>
               </a:rPr>
               <a:t>WebAssembly</a:t>
             </a:r>
@@ -6997,8 +7199,8 @@
               <a:solidFill>
                 <a:schemeClr val="bg1"/>
               </a:solidFill>
-              <a:latin typeface="Comic Sans MS Bold" panose="030F0702030302020204" charset="0"/>
-              <a:cs typeface="Comic Sans MS Bold" panose="030F0702030302020204" charset="0"/>
+              <a:latin typeface="Comic Sans MS Bold" panose="030F0902030302020204" charset="0"/>
+              <a:cs typeface="Comic Sans MS Bold" panose="030F0902030302020204" charset="0"/>
             </a:endParaRPr>
           </a:p>
         </p:txBody>
@@ -7126,8 +7328,8 @@
                   <a:solidFill>
                     <a:schemeClr val="bg1"/>
                   </a:solidFill>
-                  <a:latin typeface="Comic Sans MS Bold" panose="030F0702030302020204" charset="0"/>
-                  <a:cs typeface="Comic Sans MS Bold" panose="030F0702030302020204" charset="0"/>
+                  <a:latin typeface="Comic Sans MS Bold" panose="030F0902030302020204" charset="0"/>
+                  <a:cs typeface="Comic Sans MS Bold" panose="030F0902030302020204" charset="0"/>
                 </a:rPr>
                 <a:t>Node.js Advance</a:t>
               </a:r>
@@ -7136,8 +7338,8 @@
                   <a:solidFill>
                     <a:schemeClr val="bg1"/>
                   </a:solidFill>
-                  <a:latin typeface="Comic Sans MS Bold" panose="030F0702030302020204" charset="0"/>
-                  <a:cs typeface="Comic Sans MS Bold" panose="030F0702030302020204" charset="0"/>
+                  <a:latin typeface="Comic Sans MS Bold" panose="030F0902030302020204" charset="0"/>
+                  <a:cs typeface="Comic Sans MS Bold" panose="030F0902030302020204" charset="0"/>
                 </a:rPr>
                 <a:t>d</a:t>
               </a:r>
@@ -7145,8 +7347,8 @@
                 <a:solidFill>
                   <a:schemeClr val="bg1"/>
                 </a:solidFill>
-                <a:latin typeface="Comic Sans MS Bold" panose="030F0702030302020204" charset="0"/>
-                <a:cs typeface="Comic Sans MS Bold" panose="030F0702030302020204" charset="0"/>
+                <a:latin typeface="Comic Sans MS Bold" panose="030F0902030302020204" charset="0"/>
+                <a:cs typeface="Comic Sans MS Bold" panose="030F0902030302020204" charset="0"/>
               </a:endParaRPr>
             </a:p>
           </p:txBody>
@@ -7177,8 +7379,8 @@
                   <a:solidFill>
                     <a:srgbClr val="FEB692"/>
                   </a:solidFill>
-                  <a:latin typeface="Comic Sans MS Bold" panose="030F0702030302020204" charset="0"/>
-                  <a:cs typeface="Comic Sans MS Bold" panose="030F0702030302020204" charset="0"/>
+                  <a:latin typeface="Comic Sans MS Bold" panose="030F0902030302020204" charset="0"/>
+                  <a:cs typeface="Comic Sans MS Bold" panose="030F0902030302020204" charset="0"/>
                 </a:rPr>
                 <a:t>cluster</a:t>
               </a:r>
@@ -7186,8 +7388,8 @@
                 <a:solidFill>
                   <a:srgbClr val="FEB692"/>
                 </a:solidFill>
-                <a:latin typeface="Comic Sans MS Bold" panose="030F0702030302020204" charset="0"/>
-                <a:cs typeface="Comic Sans MS Bold" panose="030F0702030302020204" charset="0"/>
+                <a:latin typeface="Comic Sans MS Bold" panose="030F0902030302020204" charset="0"/>
+                <a:cs typeface="Comic Sans MS Bold" panose="030F0902030302020204" charset="0"/>
               </a:endParaRPr>
             </a:p>
           </p:txBody>
@@ -7316,8 +7518,8 @@
                   <a:solidFill>
                     <a:schemeClr val="bg1"/>
                   </a:solidFill>
-                  <a:latin typeface="Comic Sans MS Bold" panose="030F0702030302020204" charset="0"/>
-                  <a:cs typeface="Comic Sans MS Bold" panose="030F0702030302020204" charset="0"/>
+                  <a:latin typeface="Comic Sans MS Bold" panose="030F0902030302020204" charset="0"/>
+                  <a:cs typeface="Comic Sans MS Bold" panose="030F0902030302020204" charset="0"/>
                 </a:rPr>
                 <a:t>Design </a:t>
               </a:r>
@@ -7326,8 +7528,8 @@
                   <a:solidFill>
                     <a:schemeClr val="bg1"/>
                   </a:solidFill>
-                  <a:latin typeface="Comic Sans MS Bold" panose="030F0702030302020204" charset="0"/>
-                  <a:cs typeface="Comic Sans MS Bold" panose="030F0702030302020204" charset="0"/>
+                  <a:latin typeface="Comic Sans MS Bold" panose="030F0902030302020204" charset="0"/>
+                  <a:cs typeface="Comic Sans MS Bold" panose="030F0902030302020204" charset="0"/>
                 </a:rPr>
                 <a:t>Pattern</a:t>
               </a:r>
@@ -7335,8 +7537,8 @@
                 <a:solidFill>
                   <a:schemeClr val="bg1"/>
                 </a:solidFill>
-                <a:latin typeface="Comic Sans MS Bold" panose="030F0702030302020204" charset="0"/>
-                <a:cs typeface="Comic Sans MS Bold" panose="030F0702030302020204" charset="0"/>
+                <a:latin typeface="Comic Sans MS Bold" panose="030F0902030302020204" charset="0"/>
+                <a:cs typeface="Comic Sans MS Bold" panose="030F0902030302020204" charset="0"/>
               </a:endParaRPr>
             </a:p>
           </p:txBody>
@@ -7367,8 +7569,8 @@
                   <a:solidFill>
                     <a:srgbClr val="FEB692"/>
                   </a:solidFill>
-                  <a:latin typeface="Comic Sans MS Bold" panose="030F0702030302020204" charset="0"/>
-                  <a:cs typeface="Comic Sans MS Bold" panose="030F0702030302020204" charset="0"/>
+                  <a:latin typeface="Comic Sans MS Bold" panose="030F0902030302020204" charset="0"/>
+                  <a:cs typeface="Comic Sans MS Bold" panose="030F0902030302020204" charset="0"/>
                 </a:rPr>
                 <a:t>Prototype</a:t>
               </a:r>
@@ -7376,8 +7578,8 @@
                 <a:solidFill>
                   <a:srgbClr val="FEB692"/>
                 </a:solidFill>
-                <a:latin typeface="Comic Sans MS Bold" panose="030F0702030302020204" charset="0"/>
-                <a:cs typeface="Comic Sans MS Bold" panose="030F0702030302020204" charset="0"/>
+                <a:latin typeface="Comic Sans MS Bold" panose="030F0902030302020204" charset="0"/>
+                <a:cs typeface="Comic Sans MS Bold" panose="030F0902030302020204" charset="0"/>
               </a:endParaRPr>
             </a:p>
           </p:txBody>
@@ -7401,6 +7603,12 @@
     </mc:Fallback>
   </mc:AlternateContent>
 </p:sld>
+</file>
+
+<file path=ppt/tags/tag1.xml><?xml version="1.0" encoding="utf-8"?>
+<p:tagLst xmlns:p="http://schemas.openxmlformats.org/presentationml/2006/main">
+  <p:tag name="commondata" val="eyJoZGlkIjoiNDE4MDNlNDFmYzE5YTcxMDYzOTUyOTkxYTk4MGQ2Y2UifQ=="/>
+</p:tagLst>
 </file>
 
 <file path=ppt/theme/theme1.xml><?xml version="1.0" encoding="utf-8"?>

</xml_diff>

<commit_message>
add ai auto test agent
</commit_message>
<xml_diff>
--- a/公众号封面.pptx
+++ b/公众号封面.pptx
@@ -5,7 +5,7 @@
     <p:sldMasterId id="2147483648" r:id="rId1"/>
   </p:sldMasterIdLst>
   <p:notesMasterIdLst>
-    <p:notesMasterId r:id="rId25"/>
+    <p:notesMasterId r:id="rId26"/>
   </p:notesMasterIdLst>
   <p:sldIdLst>
     <p:sldId id="281" r:id="rId3"/>
@@ -29,12 +29,13 @@
     <p:sldId id="324" r:id="rId21"/>
     <p:sldId id="326" r:id="rId22"/>
     <p:sldId id="328" r:id="rId23"/>
-    <p:sldId id="297" r:id="rId24"/>
+    <p:sldId id="329" r:id="rId24"/>
+    <p:sldId id="297" r:id="rId25"/>
   </p:sldIdLst>
   <p:sldSz cx="12192000" cy="6858000"/>
   <p:notesSz cx="6858000" cy="9144000"/>
   <p:custDataLst>
-    <p:tags r:id="rId29"/>
+    <p:tags r:id="rId30"/>
   </p:custDataLst>
   <p:defaultTextStyle>
     <a:defPPr>
@@ -3264,7 +3265,7 @@
         <a:spcBef>
           <a:spcPts val="1000"/>
         </a:spcBef>
-        <a:buFont typeface="Arial" panose="020B0704020202020204" pitchFamily="34" charset="0"/>
+        <a:buFont typeface="Arial" panose="020B0604020202090204" pitchFamily="34" charset="0"/>
         <a:buChar char="•"/>
         <a:defRPr sz="2800" kern="1200">
           <a:solidFill>
@@ -3282,7 +3283,7 @@
         <a:spcBef>
           <a:spcPts val="500"/>
         </a:spcBef>
-        <a:buFont typeface="Arial" panose="020B0704020202020204" pitchFamily="34" charset="0"/>
+        <a:buFont typeface="Arial" panose="020B0604020202090204" pitchFamily="34" charset="0"/>
         <a:buChar char="•"/>
         <a:defRPr sz="2400" kern="1200">
           <a:solidFill>
@@ -3300,7 +3301,7 @@
         <a:spcBef>
           <a:spcPts val="500"/>
         </a:spcBef>
-        <a:buFont typeface="Arial" panose="020B0704020202020204" pitchFamily="34" charset="0"/>
+        <a:buFont typeface="Arial" panose="020B0604020202090204" pitchFamily="34" charset="0"/>
         <a:buChar char="•"/>
         <a:defRPr sz="2000" kern="1200">
           <a:solidFill>
@@ -3318,7 +3319,7 @@
         <a:spcBef>
           <a:spcPts val="500"/>
         </a:spcBef>
-        <a:buFont typeface="Arial" panose="020B0704020202020204" pitchFamily="34" charset="0"/>
+        <a:buFont typeface="Arial" panose="020B0604020202090204" pitchFamily="34" charset="0"/>
         <a:buChar char="•"/>
         <a:defRPr sz="1800" kern="1200">
           <a:solidFill>
@@ -3336,7 +3337,7 @@
         <a:spcBef>
           <a:spcPts val="500"/>
         </a:spcBef>
-        <a:buFont typeface="Arial" panose="020B0704020202020204" pitchFamily="34" charset="0"/>
+        <a:buFont typeface="Arial" panose="020B0604020202090204" pitchFamily="34" charset="0"/>
         <a:buChar char="•"/>
         <a:defRPr sz="1800" kern="1200">
           <a:solidFill>
@@ -3354,7 +3355,7 @@
         <a:spcBef>
           <a:spcPts val="500"/>
         </a:spcBef>
-        <a:buFont typeface="Arial" panose="020B0704020202020204" pitchFamily="34" charset="0"/>
+        <a:buFont typeface="Arial" panose="020B0604020202090204" pitchFamily="34" charset="0"/>
         <a:buChar char="•"/>
         <a:defRPr sz="1800" kern="1200">
           <a:solidFill>
@@ -3372,7 +3373,7 @@
         <a:spcBef>
           <a:spcPts val="500"/>
         </a:spcBef>
-        <a:buFont typeface="Arial" panose="020B0704020202020204" pitchFamily="34" charset="0"/>
+        <a:buFont typeface="Arial" panose="020B0604020202090204" pitchFamily="34" charset="0"/>
         <a:buChar char="•"/>
         <a:defRPr sz="1800" kern="1200">
           <a:solidFill>
@@ -3390,7 +3391,7 @@
         <a:spcBef>
           <a:spcPts val="500"/>
         </a:spcBef>
-        <a:buFont typeface="Arial" panose="020B0704020202020204" pitchFamily="34" charset="0"/>
+        <a:buFont typeface="Arial" panose="020B0604020202090204" pitchFamily="34" charset="0"/>
         <a:buChar char="•"/>
         <a:defRPr sz="1800" kern="1200">
           <a:solidFill>
@@ -3408,7 +3409,7 @@
         <a:spcBef>
           <a:spcPts val="500"/>
         </a:spcBef>
-        <a:buFont typeface="Arial" panose="020B0704020202020204" pitchFamily="34" charset="0"/>
+        <a:buFont typeface="Arial" panose="020B0604020202090204" pitchFamily="34" charset="0"/>
         <a:buChar char="•"/>
         <a:defRPr sz="1800" kern="1200">
           <a:solidFill>
@@ -6066,6 +6067,140 @@
         <p:nvPr/>
       </p:nvGrpSpPr>
       <p:grpSpPr/>
+      <p:sp>
+        <p:nvSpPr>
+          <p:cNvPr id="3" name="矩形 2"/>
+          <p:cNvSpPr/>
+          <p:nvPr/>
+        </p:nvSpPr>
+        <p:spPr>
+          <a:xfrm>
+            <a:off x="2765425" y="1481455"/>
+            <a:ext cx="5781040" cy="2459990"/>
+          </a:xfrm>
+          <a:prstGeom prst="rect">
+            <a:avLst/>
+          </a:prstGeom>
+          <a:gradFill>
+            <a:gsLst>
+              <a:gs pos="0">
+                <a:srgbClr val="F7FF00"/>
+              </a:gs>
+              <a:gs pos="100000">
+                <a:srgbClr val="00E4FF"/>
+              </a:gs>
+            </a:gsLst>
+            <a:lin ang="0" scaled="0"/>
+          </a:gradFill>
+          <a:ln>
+            <a:noFill/>
+          </a:ln>
+        </p:spPr>
+        <p:style>
+          <a:lnRef idx="2">
+            <a:schemeClr val="accent1">
+              <a:shade val="50000"/>
+            </a:schemeClr>
+          </a:lnRef>
+          <a:fillRef idx="1">
+            <a:schemeClr val="accent1"/>
+          </a:fillRef>
+          <a:effectRef idx="0">
+            <a:schemeClr val="accent1"/>
+          </a:effectRef>
+          <a:fontRef idx="minor">
+            <a:schemeClr val="lt1"/>
+          </a:fontRef>
+        </p:style>
+        <p:txBody>
+          <a:bodyPr rtlCol="0" anchor="ctr"/>
+          <a:p>
+            <a:pPr algn="ctr"/>
+            <a:endParaRPr lang="zh-CN" altLang="en-US"/>
+          </a:p>
+        </p:txBody>
+      </p:sp>
+      <p:pic>
+        <p:nvPicPr>
+          <p:cNvPr id="4" name="图片 3"/>
+          <p:cNvPicPr/>
+          <p:nvPr/>
+        </p:nvPicPr>
+        <p:blipFill>
+          <a:blip r:embed="rId1">
+            <a:alphaModFix amt="80000"/>
+          </a:blip>
+          <a:stretch>
+            <a:fillRect/>
+          </a:stretch>
+        </p:blipFill>
+        <p:spPr>
+          <a:xfrm>
+            <a:off x="4810125" y="2428875"/>
+            <a:ext cx="3581400" cy="768985"/>
+          </a:xfrm>
+          <a:prstGeom prst="rect">
+            <a:avLst/>
+          </a:prstGeom>
+          <a:effectLst/>
+        </p:spPr>
+      </p:pic>
+      <p:pic>
+        <p:nvPicPr>
+          <p:cNvPr id="8" name="图片 7" descr="智能机器人"/>
+          <p:cNvPicPr>
+            <a:picLocks noChangeAspect="1"/>
+          </p:cNvPicPr>
+          <p:nvPr/>
+        </p:nvPicPr>
+        <p:blipFill>
+          <a:blip r:embed="rId2">
+            <a:alphaModFix amt="86000"/>
+          </a:blip>
+          <a:stretch>
+            <a:fillRect/>
+          </a:stretch>
+        </p:blipFill>
+        <p:spPr>
+          <a:xfrm>
+            <a:off x="3151505" y="1938020"/>
+            <a:ext cx="1490980" cy="1490980"/>
+          </a:xfrm>
+          <a:prstGeom prst="rect">
+            <a:avLst/>
+          </a:prstGeom>
+        </p:spPr>
+      </p:pic>
+    </p:spTree>
+  </p:cSld>
+  <p:clrMapOvr>
+    <a:masterClrMapping/>
+  </p:clrMapOvr>
+  <mc:AlternateContent xmlns:mc="http://schemas.openxmlformats.org/markup-compatibility/2006">
+    <mc:Choice xmlns:p14="http://schemas.microsoft.com/office/powerpoint/2010/main" Requires="p14">
+      <p:transition spd="slow" p14:dur="1500" advClick="0" advTm="0">
+        <p:random/>
+      </p:transition>
+    </mc:Choice>
+    <mc:Fallback>
+      <p:transition spd="slow" advClick="0" advTm="0">
+        <p:random/>
+      </p:transition>
+    </mc:Fallback>
+  </mc:AlternateContent>
+</p:sld>
+</file>
+
+<file path=ppt/slides/slide23.xml><?xml version="1.0" encoding="utf-8"?>
+<p:sld xmlns:a="http://schemas.openxmlformats.org/drawingml/2006/main" xmlns:r="http://schemas.openxmlformats.org/officeDocument/2006/relationships" xmlns:p="http://schemas.openxmlformats.org/presentationml/2006/main">
+  <p:cSld>
+    <p:spTree>
+      <p:nvGrpSpPr>
+        <p:cNvPr id="1" name=""/>
+        <p:cNvGrpSpPr/>
+        <p:nvPr/>
+      </p:nvGrpSpPr>
+      <p:grpSpPr/>
       <p:grpSp>
         <p:nvGrpSpPr>
           <p:cNvPr id="4" name="组合 3"/>

</xml_diff>